<commit_message>
Update 2.pptx complete and indexed 3,4.pptx
</commit_message>
<xml_diff>
--- a/3.pptx
+++ b/3.pptx
@@ -7,31 +7,30 @@
   <p:sldIdLst>
     <p:sldId id="256" r:id="rId2"/>
     <p:sldId id="257" r:id="rId3"/>
-    <p:sldId id="295" r:id="rId4"/>
-    <p:sldId id="258" r:id="rId5"/>
-    <p:sldId id="297" r:id="rId6"/>
-    <p:sldId id="298" r:id="rId7"/>
-    <p:sldId id="299" r:id="rId8"/>
-    <p:sldId id="300" r:id="rId9"/>
-    <p:sldId id="301" r:id="rId10"/>
-    <p:sldId id="302" r:id="rId11"/>
-    <p:sldId id="303" r:id="rId12"/>
-    <p:sldId id="304" r:id="rId13"/>
-    <p:sldId id="305" r:id="rId14"/>
-    <p:sldId id="296" r:id="rId15"/>
-    <p:sldId id="306" r:id="rId16"/>
-    <p:sldId id="307" r:id="rId17"/>
-    <p:sldId id="308" r:id="rId18"/>
-    <p:sldId id="311" r:id="rId19"/>
-    <p:sldId id="309" r:id="rId20"/>
-    <p:sldId id="310" r:id="rId21"/>
-    <p:sldId id="312" r:id="rId22"/>
-    <p:sldId id="313" r:id="rId23"/>
-    <p:sldId id="314" r:id="rId24"/>
-    <p:sldId id="318" r:id="rId25"/>
-    <p:sldId id="316" r:id="rId26"/>
-    <p:sldId id="317" r:id="rId27"/>
-    <p:sldId id="315" r:id="rId28"/>
+    <p:sldId id="294" r:id="rId4"/>
+    <p:sldId id="320" r:id="rId5"/>
+    <p:sldId id="321" r:id="rId6"/>
+    <p:sldId id="322" r:id="rId7"/>
+    <p:sldId id="323" r:id="rId8"/>
+    <p:sldId id="324" r:id="rId9"/>
+    <p:sldId id="325" r:id="rId10"/>
+    <p:sldId id="326" r:id="rId11"/>
+    <p:sldId id="327" r:id="rId12"/>
+    <p:sldId id="328" r:id="rId13"/>
+    <p:sldId id="329" r:id="rId14"/>
+    <p:sldId id="330" r:id="rId15"/>
+    <p:sldId id="331" r:id="rId16"/>
+    <p:sldId id="295" r:id="rId17"/>
+    <p:sldId id="258" r:id="rId18"/>
+    <p:sldId id="297" r:id="rId19"/>
+    <p:sldId id="298" r:id="rId20"/>
+    <p:sldId id="299" r:id="rId21"/>
+    <p:sldId id="300" r:id="rId22"/>
+    <p:sldId id="301" r:id="rId23"/>
+    <p:sldId id="302" r:id="rId24"/>
+    <p:sldId id="303" r:id="rId25"/>
+    <p:sldId id="304" r:id="rId26"/>
+    <p:sldId id="305" r:id="rId27"/>
   </p:sldIdLst>
   <p:sldSz cx="12192000" cy="6858000"/>
   <p:notesSz cx="6858000" cy="9144000"/>
@@ -285,7 +284,7 @@
           <a:p>
             <a:fld id="{76969C88-B244-455D-A017-012B25B1ACDD}" type="datetimeFigureOut">
               <a:rPr lang="en-US" smtClean="0"/>
-              <a:t>2/1/2024</a:t>
+              <a:t>2/2/2024</a:t>
             </a:fld>
             <a:endParaRPr lang="en-US"/>
           </a:p>
@@ -499,7 +498,7 @@
           <a:p>
             <a:fld id="{76969C88-B244-455D-A017-012B25B1ACDD}" type="datetimeFigureOut">
               <a:rPr lang="en-US" smtClean="0"/>
-              <a:t>2/1/2024</a:t>
+              <a:t>2/2/2024</a:t>
             </a:fld>
             <a:endParaRPr lang="en-US"/>
           </a:p>
@@ -723,7 +722,7 @@
           <a:p>
             <a:fld id="{76969C88-B244-455D-A017-012B25B1ACDD}" type="datetimeFigureOut">
               <a:rPr lang="en-US" smtClean="0"/>
-              <a:t>2/1/2024</a:t>
+              <a:t>2/2/2024</a:t>
             </a:fld>
             <a:endParaRPr lang="en-US"/>
           </a:p>
@@ -963,7 +962,7 @@
           <a:p>
             <a:fld id="{76969C88-B244-455D-A017-012B25B1ACDD}" type="datetimeFigureOut">
               <a:rPr lang="en-US" smtClean="0"/>
-              <a:t>2/1/2024</a:t>
+              <a:t>2/2/2024</a:t>
             </a:fld>
             <a:endParaRPr lang="en-US" dirty="0"/>
           </a:p>
@@ -1184,7 +1183,7 @@
           <a:p>
             <a:fld id="{76969C88-B244-455D-A017-012B25B1ACDD}" type="datetimeFigureOut">
               <a:rPr lang="en-US" smtClean="0"/>
-              <a:t>2/1/2024</a:t>
+              <a:t>2/2/2024</a:t>
             </a:fld>
             <a:endParaRPr lang="en-US"/>
           </a:p>
@@ -1474,7 +1473,7 @@
           <a:p>
             <a:fld id="{76969C88-B244-455D-A017-012B25B1ACDD}" type="datetimeFigureOut">
               <a:rPr lang="en-US" smtClean="0"/>
-              <a:t>2/1/2024</a:t>
+              <a:t>2/2/2024</a:t>
             </a:fld>
             <a:endParaRPr lang="en-US"/>
           </a:p>
@@ -1832,7 +1831,7 @@
           <a:p>
             <a:fld id="{76969C88-B244-455D-A017-012B25B1ACDD}" type="datetimeFigureOut">
               <a:rPr lang="en-US" smtClean="0"/>
-              <a:t>2/1/2024</a:t>
+              <a:t>2/2/2024</a:t>
             </a:fld>
             <a:endParaRPr lang="en-US"/>
           </a:p>
@@ -1998,7 +1997,7 @@
           <a:p>
             <a:fld id="{76969C88-B244-455D-A017-012B25B1ACDD}" type="datetimeFigureOut">
               <a:rPr lang="en-US" smtClean="0"/>
-              <a:t>2/1/2024</a:t>
+              <a:t>2/2/2024</a:t>
             </a:fld>
             <a:endParaRPr lang="en-US"/>
           </a:p>
@@ -2057,7 +2056,7 @@
           <a:p>
             <a:fld id="{76969C88-B244-455D-A017-012B25B1ACDD}" type="datetimeFigureOut">
               <a:rPr lang="en-US" smtClean="0"/>
-              <a:t>2/1/2024</a:t>
+              <a:t>2/2/2024</a:t>
             </a:fld>
             <a:endParaRPr lang="en-US"/>
           </a:p>
@@ -2385,7 +2384,7 @@
           <a:p>
             <a:fld id="{76969C88-B244-455D-A017-012B25B1ACDD}" type="datetimeFigureOut">
               <a:rPr lang="en-US" smtClean="0"/>
-              <a:t>2/1/2024</a:t>
+              <a:t>2/2/2024</a:t>
             </a:fld>
             <a:endParaRPr lang="en-US"/>
           </a:p>
@@ -2692,7 +2691,7 @@
           <a:p>
             <a:fld id="{76969C88-B244-455D-A017-012B25B1ACDD}" type="datetimeFigureOut">
               <a:rPr lang="en-US" smtClean="0"/>
-              <a:t>2/1/2024</a:t>
+              <a:t>2/2/2024</a:t>
             </a:fld>
             <a:endParaRPr lang="en-US"/>
           </a:p>
@@ -3458,7 +3457,7 @@
             <a:fld id="{76969C88-B244-455D-A017-012B25B1ACDD}" type="datetimeFigureOut">
               <a:rPr lang="en-US" smtClean="0"/>
               <a:pPr/>
-              <a:t>2/1/2024</a:t>
+              <a:t>2/2/2024</a:t>
             </a:fld>
             <a:endParaRPr lang="en-US"/>
           </a:p>
@@ -4441,7 +4440,7 @@
           <p:cNvPr id="2" name="제목 1">
             <a:extLst>
               <a:ext uri="{FF2B5EF4-FFF2-40B4-BE49-F238E27FC236}">
-                <a16:creationId xmlns:a16="http://schemas.microsoft.com/office/drawing/2014/main" id="{FDA77268-47C0-5813-C4FA-D23815A5A1E0}"/>
+                <a16:creationId xmlns:a16="http://schemas.microsoft.com/office/drawing/2014/main" id="{0A369040-E1C4-B9A4-6456-1FE71B51C3C8}"/>
               </a:ext>
             </a:extLst>
           </p:cNvPr>
@@ -4459,7 +4458,7 @@
           <a:p>
             <a:r>
               <a:rPr lang="en-US" altLang="ko-KR" dirty="0"/>
-              <a:t>Ethernet</a:t>
+              <a:t>ICMP</a:t>
             </a:r>
             <a:endParaRPr lang="ko-KR" altLang="en-US" dirty="0"/>
           </a:p>
@@ -4470,7 +4469,7 @@
           <p:cNvPr id="3" name="내용 개체 틀 2">
             <a:extLst>
               <a:ext uri="{FF2B5EF4-FFF2-40B4-BE49-F238E27FC236}">
-                <a16:creationId xmlns:a16="http://schemas.microsoft.com/office/drawing/2014/main" id="{352D1D30-E06A-3FDF-AC6B-E9045CCE7593}"/>
+                <a16:creationId xmlns:a16="http://schemas.microsoft.com/office/drawing/2014/main" id="{6FCC135F-16CD-C5ED-CA5F-C86F45C50872}"/>
               </a:ext>
             </a:extLst>
           </p:cNvPr>
@@ -4493,7 +4492,7 @@
     </p:spTree>
     <p:extLst>
       <p:ext uri="{BB962C8B-B14F-4D97-AF65-F5344CB8AC3E}">
-        <p14:creationId xmlns:p14="http://schemas.microsoft.com/office/powerpoint/2010/main" val="219724582"/>
+        <p14:creationId xmlns:p14="http://schemas.microsoft.com/office/powerpoint/2010/main" val="2525825330"/>
       </p:ext>
     </p:extLst>
   </p:cSld>
@@ -4525,7 +4524,7 @@
           <p:cNvPr id="2" name="제목 1">
             <a:extLst>
               <a:ext uri="{FF2B5EF4-FFF2-40B4-BE49-F238E27FC236}">
-                <a16:creationId xmlns:a16="http://schemas.microsoft.com/office/drawing/2014/main" id="{40EF865C-99C2-969A-33CB-633C1547A109}"/>
+                <a16:creationId xmlns:a16="http://schemas.microsoft.com/office/drawing/2014/main" id="{1314160E-EB42-1B88-7D1E-DBFA15A199DB}"/>
               </a:ext>
             </a:extLst>
           </p:cNvPr>
@@ -4542,9 +4541,10 @@
           <a:lstStyle/>
           <a:p>
             <a:r>
-              <a:rPr lang="ko-KR" altLang="en-US" dirty="0"/>
-              <a:t>다중 접속 프로토콜</a:t>
-            </a:r>
+              <a:rPr lang="en-US" altLang="ko-KR" dirty="0"/>
+              <a:t>Router</a:t>
+            </a:r>
+            <a:endParaRPr lang="ko-KR" altLang="en-US" dirty="0"/>
           </a:p>
         </p:txBody>
       </p:sp>
@@ -4553,7 +4553,7 @@
           <p:cNvPr id="3" name="내용 개체 틀 2">
             <a:extLst>
               <a:ext uri="{FF2B5EF4-FFF2-40B4-BE49-F238E27FC236}">
-                <a16:creationId xmlns:a16="http://schemas.microsoft.com/office/drawing/2014/main" id="{C40AC823-49BC-E0AC-7E87-EC7E94D52A4C}"/>
+                <a16:creationId xmlns:a16="http://schemas.microsoft.com/office/drawing/2014/main" id="{3D53C142-D1EA-562D-67CC-A05387B237DF}"/>
               </a:ext>
             </a:extLst>
           </p:cNvPr>
@@ -4576,7 +4576,7 @@
     </p:spTree>
     <p:extLst>
       <p:ext uri="{BB962C8B-B14F-4D97-AF65-F5344CB8AC3E}">
-        <p14:creationId xmlns:p14="http://schemas.microsoft.com/office/powerpoint/2010/main" val="160347746"/>
+        <p14:creationId xmlns:p14="http://schemas.microsoft.com/office/powerpoint/2010/main" val="1656999248"/>
       </p:ext>
     </p:extLst>
   </p:cSld>
@@ -4608,7 +4608,7 @@
           <p:cNvPr id="2" name="제목 1">
             <a:extLst>
               <a:ext uri="{FF2B5EF4-FFF2-40B4-BE49-F238E27FC236}">
-                <a16:creationId xmlns:a16="http://schemas.microsoft.com/office/drawing/2014/main" id="{0E6DF6C7-71C6-F41A-3C59-C6CDAEA1C5EB}"/>
+                <a16:creationId xmlns:a16="http://schemas.microsoft.com/office/drawing/2014/main" id="{D521AC9A-E519-EE7F-1217-F1D2B6EEEBD2}"/>
               </a:ext>
             </a:extLst>
           </p:cNvPr>
@@ -4626,7 +4626,7 @@
           <a:p>
             <a:r>
               <a:rPr lang="en-US" altLang="ko-KR" dirty="0"/>
-              <a:t>CSMA/CD</a:t>
+              <a:t>OSPF, RIP (Intra-AS)</a:t>
             </a:r>
             <a:endParaRPr lang="ko-KR" altLang="en-US" dirty="0"/>
           </a:p>
@@ -4637,7 +4637,7 @@
           <p:cNvPr id="3" name="내용 개체 틀 2">
             <a:extLst>
               <a:ext uri="{FF2B5EF4-FFF2-40B4-BE49-F238E27FC236}">
-                <a16:creationId xmlns:a16="http://schemas.microsoft.com/office/drawing/2014/main" id="{AD50170D-D0BB-69DC-D993-4EB7AE105F11}"/>
+                <a16:creationId xmlns:a16="http://schemas.microsoft.com/office/drawing/2014/main" id="{CDD3BA5E-AB57-8DB7-09B8-05453F235F00}"/>
               </a:ext>
             </a:extLst>
           </p:cNvPr>
@@ -4660,7 +4660,7 @@
     </p:spTree>
     <p:extLst>
       <p:ext uri="{BB962C8B-B14F-4D97-AF65-F5344CB8AC3E}">
-        <p14:creationId xmlns:p14="http://schemas.microsoft.com/office/powerpoint/2010/main" val="3938073431"/>
+        <p14:creationId xmlns:p14="http://schemas.microsoft.com/office/powerpoint/2010/main" val="3967982616"/>
       </p:ext>
     </p:extLst>
   </p:cSld>
@@ -4692,7 +4692,7 @@
           <p:cNvPr id="2" name="제목 1">
             <a:extLst>
               <a:ext uri="{FF2B5EF4-FFF2-40B4-BE49-F238E27FC236}">
-                <a16:creationId xmlns:a16="http://schemas.microsoft.com/office/drawing/2014/main" id="{13D882CC-F556-0303-363C-34AA8C763FD7}"/>
+                <a16:creationId xmlns:a16="http://schemas.microsoft.com/office/drawing/2014/main" id="{83291C9C-B7B2-84E0-221D-4E262D0A1D2F}"/>
               </a:ext>
             </a:extLst>
           </p:cNvPr>
@@ -4710,7 +4710,7 @@
           <a:p>
             <a:r>
               <a:rPr lang="en-US" altLang="ko-KR" dirty="0"/>
-              <a:t>Switch</a:t>
+              <a:t>BGP (Inter-AS)</a:t>
             </a:r>
             <a:endParaRPr lang="ko-KR" altLang="en-US" dirty="0"/>
           </a:p>
@@ -4721,7 +4721,7 @@
           <p:cNvPr id="3" name="내용 개체 틀 2">
             <a:extLst>
               <a:ext uri="{FF2B5EF4-FFF2-40B4-BE49-F238E27FC236}">
-                <a16:creationId xmlns:a16="http://schemas.microsoft.com/office/drawing/2014/main" id="{B48C4B06-E5BA-C721-9E39-4C426074D86F}"/>
+                <a16:creationId xmlns:a16="http://schemas.microsoft.com/office/drawing/2014/main" id="{F25F7E1C-3B60-656A-ACE4-D9E85DB99641}"/>
               </a:ext>
             </a:extLst>
           </p:cNvPr>
@@ -4744,7 +4744,7 @@
     </p:spTree>
     <p:extLst>
       <p:ext uri="{BB962C8B-B14F-4D97-AF65-F5344CB8AC3E}">
-        <p14:creationId xmlns:p14="http://schemas.microsoft.com/office/powerpoint/2010/main" val="2994615564"/>
+        <p14:creationId xmlns:p14="http://schemas.microsoft.com/office/powerpoint/2010/main" val="444810247"/>
       </p:ext>
     </p:extLst>
   </p:cSld>
@@ -4773,18 +4773,18 @@
       </p:grpSpPr>
       <p:sp>
         <p:nvSpPr>
-          <p:cNvPr id="6" name="제목 5">
-            <a:extLst>
-              <a:ext uri="{FF2B5EF4-FFF2-40B4-BE49-F238E27FC236}">
-                <a16:creationId xmlns:a16="http://schemas.microsoft.com/office/drawing/2014/main" id="{F826D273-7332-66DA-9DCE-2EDFAAD4D461}"/>
-              </a:ext>
-            </a:extLst>
-          </p:cNvPr>
-          <p:cNvSpPr>
-            <a:spLocks noGrp="1"/>
-          </p:cNvSpPr>
-          <p:nvPr>
-            <p:ph type="ctrTitle"/>
+          <p:cNvPr id="2" name="제목 1">
+            <a:extLst>
+              <a:ext uri="{FF2B5EF4-FFF2-40B4-BE49-F238E27FC236}">
+                <a16:creationId xmlns:a16="http://schemas.microsoft.com/office/drawing/2014/main" id="{C4F4B957-4A6D-57BD-C54A-A2260F4DF448}"/>
+              </a:ext>
+            </a:extLst>
+          </p:cNvPr>
+          <p:cNvSpPr>
+            <a:spLocks noGrp="1"/>
+          </p:cNvSpPr>
+          <p:nvPr>
+            <p:ph type="title"/>
           </p:nvPr>
         </p:nvSpPr>
         <p:spPr/>
@@ -4794,7 +4794,7 @@
           <a:p>
             <a:r>
               <a:rPr lang="en-US" altLang="ko-KR" dirty="0"/>
-              <a:t>Layer 1 </a:t>
+              <a:t>Hot Potato Routing</a:t>
             </a:r>
             <a:endParaRPr lang="ko-KR" altLang="en-US" dirty="0"/>
           </a:p>
@@ -4802,18 +4802,18 @@
       </p:sp>
       <p:sp>
         <p:nvSpPr>
-          <p:cNvPr id="7" name="부제목 6">
-            <a:extLst>
-              <a:ext uri="{FF2B5EF4-FFF2-40B4-BE49-F238E27FC236}">
-                <a16:creationId xmlns:a16="http://schemas.microsoft.com/office/drawing/2014/main" id="{4FD3139D-811E-04AA-6A66-753832B7229B}"/>
-              </a:ext>
-            </a:extLst>
-          </p:cNvPr>
-          <p:cNvSpPr>
-            <a:spLocks noGrp="1"/>
-          </p:cNvSpPr>
-          <p:nvPr>
-            <p:ph type="subTitle" idx="1"/>
+          <p:cNvPr id="3" name="내용 개체 틀 2">
+            <a:extLst>
+              <a:ext uri="{FF2B5EF4-FFF2-40B4-BE49-F238E27FC236}">
+                <a16:creationId xmlns:a16="http://schemas.microsoft.com/office/drawing/2014/main" id="{63BB3511-1B5A-9ACA-0939-41123542E162}"/>
+              </a:ext>
+            </a:extLst>
+          </p:cNvPr>
+          <p:cNvSpPr>
+            <a:spLocks noGrp="1"/>
+          </p:cNvSpPr>
+          <p:nvPr>
+            <p:ph idx="1"/>
           </p:nvPr>
         </p:nvSpPr>
         <p:spPr/>
@@ -4821,28 +4821,14 @@
           <a:bodyPr/>
           <a:lstStyle/>
           <a:p>
-            <a:r>
-              <a:rPr lang="ko-KR" altLang="en-US" dirty="0"/>
-              <a:t>물리 계층</a:t>
-            </a:r>
-            <a:br>
-              <a:rPr lang="en-US" altLang="ko-KR" dirty="0"/>
-            </a:br>
-            <a:r>
-              <a:rPr lang="en-US" altLang="ko-KR" dirty="0"/>
-              <a:t>(Physical Layer)</a:t>
-            </a:r>
-            <a:endParaRPr lang="ko-KR" altLang="en-US" dirty="0"/>
-          </a:p>
-          <a:p>
-            <a:endParaRPr lang="ko-KR" altLang="en-US" dirty="0"/>
+            <a:endParaRPr lang="ko-KR" altLang="en-US"/>
           </a:p>
         </p:txBody>
       </p:sp>
     </p:spTree>
     <p:extLst>
       <p:ext uri="{BB962C8B-B14F-4D97-AF65-F5344CB8AC3E}">
-        <p14:creationId xmlns:p14="http://schemas.microsoft.com/office/powerpoint/2010/main" val="2904713976"/>
+        <p14:creationId xmlns:p14="http://schemas.microsoft.com/office/powerpoint/2010/main" val="3920241493"/>
       </p:ext>
     </p:extLst>
   </p:cSld>
@@ -4874,7 +4860,7 @@
           <p:cNvPr id="2" name="제목 1">
             <a:extLst>
               <a:ext uri="{FF2B5EF4-FFF2-40B4-BE49-F238E27FC236}">
-                <a16:creationId xmlns:a16="http://schemas.microsoft.com/office/drawing/2014/main" id="{0DD83260-336B-170C-E91B-F2E68EB53686}"/>
+                <a16:creationId xmlns:a16="http://schemas.microsoft.com/office/drawing/2014/main" id="{DE0B4145-EAC0-56B9-357D-D3D49295988A}"/>
               </a:ext>
             </a:extLst>
           </p:cNvPr>
@@ -4891,9 +4877,10 @@
           <a:lstStyle/>
           <a:p>
             <a:r>
-              <a:rPr lang="ko-KR" altLang="en-US" dirty="0"/>
-              <a:t>전송모드</a:t>
-            </a:r>
+              <a:rPr lang="en-US" altLang="ko-KR" dirty="0"/>
+              <a:t>IPv6</a:t>
+            </a:r>
+            <a:endParaRPr lang="ko-KR" altLang="en-US" dirty="0"/>
           </a:p>
         </p:txBody>
       </p:sp>
@@ -4902,7 +4889,7 @@
           <p:cNvPr id="3" name="내용 개체 틀 2">
             <a:extLst>
               <a:ext uri="{FF2B5EF4-FFF2-40B4-BE49-F238E27FC236}">
-                <a16:creationId xmlns:a16="http://schemas.microsoft.com/office/drawing/2014/main" id="{F382FC43-75CE-4290-A052-49397A645387}"/>
+                <a16:creationId xmlns:a16="http://schemas.microsoft.com/office/drawing/2014/main" id="{CBC7348E-060B-EFA3-96FF-1B26127854E0}"/>
               </a:ext>
             </a:extLst>
           </p:cNvPr>
@@ -4925,7 +4912,7 @@
     </p:spTree>
     <p:extLst>
       <p:ext uri="{BB962C8B-B14F-4D97-AF65-F5344CB8AC3E}">
-        <p14:creationId xmlns:p14="http://schemas.microsoft.com/office/powerpoint/2010/main" val="306307204"/>
+        <p14:creationId xmlns:p14="http://schemas.microsoft.com/office/powerpoint/2010/main" val="1107915543"/>
       </p:ext>
     </p:extLst>
   </p:cSld>
@@ -4954,18 +4941,18 @@
       </p:grpSpPr>
       <p:sp>
         <p:nvSpPr>
-          <p:cNvPr id="2" name="제목 1">
-            <a:extLst>
-              <a:ext uri="{FF2B5EF4-FFF2-40B4-BE49-F238E27FC236}">
-                <a16:creationId xmlns:a16="http://schemas.microsoft.com/office/drawing/2014/main" id="{DD6320BC-53F4-CE76-EA60-9FDA50B62C12}"/>
-              </a:ext>
-            </a:extLst>
-          </p:cNvPr>
-          <p:cNvSpPr>
-            <a:spLocks noGrp="1"/>
-          </p:cNvSpPr>
-          <p:nvPr>
-            <p:ph type="title"/>
+          <p:cNvPr id="6" name="제목 5">
+            <a:extLst>
+              <a:ext uri="{FF2B5EF4-FFF2-40B4-BE49-F238E27FC236}">
+                <a16:creationId xmlns:a16="http://schemas.microsoft.com/office/drawing/2014/main" id="{F826D273-7332-66DA-9DCE-2EDFAAD4D461}"/>
+              </a:ext>
+            </a:extLst>
+          </p:cNvPr>
+          <p:cNvSpPr>
+            <a:spLocks noGrp="1"/>
+          </p:cNvSpPr>
+          <p:nvPr>
+            <p:ph type="ctrTitle"/>
           </p:nvPr>
         </p:nvSpPr>
         <p:spPr/>
@@ -4975,7 +4962,7 @@
           <a:p>
             <a:r>
               <a:rPr lang="en-US" altLang="ko-KR" dirty="0"/>
-              <a:t>Wireless LAN</a:t>
+              <a:t>Layer 2 </a:t>
             </a:r>
             <a:endParaRPr lang="ko-KR" altLang="en-US" dirty="0"/>
           </a:p>
@@ -4983,18 +4970,18 @@
       </p:sp>
       <p:sp>
         <p:nvSpPr>
-          <p:cNvPr id="3" name="내용 개체 틀 2">
-            <a:extLst>
-              <a:ext uri="{FF2B5EF4-FFF2-40B4-BE49-F238E27FC236}">
-                <a16:creationId xmlns:a16="http://schemas.microsoft.com/office/drawing/2014/main" id="{953E09DC-3047-015A-89FB-7EC983ACD03B}"/>
-              </a:ext>
-            </a:extLst>
-          </p:cNvPr>
-          <p:cNvSpPr>
-            <a:spLocks noGrp="1"/>
-          </p:cNvSpPr>
-          <p:nvPr>
-            <p:ph idx="1"/>
+          <p:cNvPr id="7" name="부제목 6">
+            <a:extLst>
+              <a:ext uri="{FF2B5EF4-FFF2-40B4-BE49-F238E27FC236}">
+                <a16:creationId xmlns:a16="http://schemas.microsoft.com/office/drawing/2014/main" id="{4FD3139D-811E-04AA-6A66-753832B7229B}"/>
+              </a:ext>
+            </a:extLst>
+          </p:cNvPr>
+          <p:cNvSpPr>
+            <a:spLocks noGrp="1"/>
+          </p:cNvSpPr>
+          <p:nvPr>
+            <p:ph type="subTitle" idx="1"/>
           </p:nvPr>
         </p:nvSpPr>
         <p:spPr/>
@@ -5002,14 +4989,36 @@
           <a:bodyPr/>
           <a:lstStyle/>
           <a:p>
-            <a:endParaRPr lang="ko-KR" altLang="en-US"/>
+            <a:r>
+              <a:rPr lang="ko-KR" altLang="en-US" dirty="0"/>
+              <a:t>링크 계층</a:t>
+            </a:r>
+            <a:br>
+              <a:rPr lang="en-US" altLang="ko-KR" dirty="0"/>
+            </a:br>
+            <a:r>
+              <a:rPr lang="en-US" altLang="ko-KR" dirty="0"/>
+              <a:t>(</a:t>
+            </a:r>
+            <a:r>
+              <a:rPr lang="en-US" altLang="ko-KR" dirty="0" err="1"/>
+              <a:t>DataLink</a:t>
+            </a:r>
+            <a:r>
+              <a:rPr lang="en-US" altLang="ko-KR" dirty="0"/>
+              <a:t> Layer)</a:t>
+            </a:r>
+            <a:endParaRPr lang="ko-KR" altLang="en-US" dirty="0"/>
+          </a:p>
+          <a:p>
+            <a:endParaRPr lang="ko-KR" altLang="en-US" dirty="0"/>
           </a:p>
         </p:txBody>
       </p:sp>
     </p:spTree>
     <p:extLst>
       <p:ext uri="{BB962C8B-B14F-4D97-AF65-F5344CB8AC3E}">
-        <p14:creationId xmlns:p14="http://schemas.microsoft.com/office/powerpoint/2010/main" val="1303002981"/>
+        <p14:creationId xmlns:p14="http://schemas.microsoft.com/office/powerpoint/2010/main" val="2005904950"/>
       </p:ext>
     </p:extLst>
   </p:cSld>
@@ -5041,7 +5050,7 @@
           <p:cNvPr id="2" name="제목 1">
             <a:extLst>
               <a:ext uri="{FF2B5EF4-FFF2-40B4-BE49-F238E27FC236}">
-                <a16:creationId xmlns:a16="http://schemas.microsoft.com/office/drawing/2014/main" id="{65102E3B-2E4F-EFAD-BE72-F2112DA6669F}"/>
+                <a16:creationId xmlns:a16="http://schemas.microsoft.com/office/drawing/2014/main" id="{21D78C88-D60B-A423-06DF-69795833D900}"/>
               </a:ext>
             </a:extLst>
           </p:cNvPr>
@@ -5059,7 +5068,7 @@
           <a:p>
             <a:r>
               <a:rPr lang="en-US" altLang="ko-KR" dirty="0"/>
-              <a:t>802.11 Version</a:t>
+              <a:t>Link </a:t>
             </a:r>
             <a:endParaRPr lang="ko-KR" altLang="en-US" dirty="0"/>
           </a:p>
@@ -5070,7 +5079,7 @@
           <p:cNvPr id="3" name="내용 개체 틀 2">
             <a:extLst>
               <a:ext uri="{FF2B5EF4-FFF2-40B4-BE49-F238E27FC236}">
-                <a16:creationId xmlns:a16="http://schemas.microsoft.com/office/drawing/2014/main" id="{EF57BD06-CFF3-DFC1-936E-107FDBA5AF0A}"/>
+                <a16:creationId xmlns:a16="http://schemas.microsoft.com/office/drawing/2014/main" id="{43D27213-823D-A893-0821-380722AF66E3}"/>
               </a:ext>
             </a:extLst>
           </p:cNvPr>
@@ -5093,7 +5102,7 @@
     </p:spTree>
     <p:extLst>
       <p:ext uri="{BB962C8B-B14F-4D97-AF65-F5344CB8AC3E}">
-        <p14:creationId xmlns:p14="http://schemas.microsoft.com/office/powerpoint/2010/main" val="4216409230"/>
+        <p14:creationId xmlns:p14="http://schemas.microsoft.com/office/powerpoint/2010/main" val="762231998"/>
       </p:ext>
     </p:extLst>
   </p:cSld>
@@ -5122,18 +5131,18 @@
       </p:grpSpPr>
       <p:sp>
         <p:nvSpPr>
-          <p:cNvPr id="6" name="제목 5">
-            <a:extLst>
-              <a:ext uri="{FF2B5EF4-FFF2-40B4-BE49-F238E27FC236}">
-                <a16:creationId xmlns:a16="http://schemas.microsoft.com/office/drawing/2014/main" id="{F826D273-7332-66DA-9DCE-2EDFAAD4D461}"/>
-              </a:ext>
-            </a:extLst>
-          </p:cNvPr>
-          <p:cNvSpPr>
-            <a:spLocks noGrp="1"/>
-          </p:cNvSpPr>
-          <p:nvPr>
-            <p:ph type="ctrTitle"/>
+          <p:cNvPr id="2" name="제목 1">
+            <a:extLst>
+              <a:ext uri="{FF2B5EF4-FFF2-40B4-BE49-F238E27FC236}">
+                <a16:creationId xmlns:a16="http://schemas.microsoft.com/office/drawing/2014/main" id="{B01BDAD8-3827-549E-A422-C5D3C18D92C8}"/>
+              </a:ext>
+            </a:extLst>
+          </p:cNvPr>
+          <p:cNvSpPr>
+            <a:spLocks noGrp="1"/>
+          </p:cNvSpPr>
+          <p:nvPr>
+            <p:ph type="title"/>
           </p:nvPr>
         </p:nvSpPr>
         <p:spPr/>
@@ -5142,27 +5151,26 @@
           <a:lstStyle/>
           <a:p>
             <a:r>
-              <a:rPr lang="en-US" altLang="ko-KR" dirty="0"/>
-              <a:t>Additional </a:t>
-            </a:r>
-            <a:endParaRPr lang="ko-KR" altLang="en-US" dirty="0"/>
-          </a:p>
-        </p:txBody>
-      </p:sp>
-      <p:sp>
-        <p:nvSpPr>
-          <p:cNvPr id="7" name="부제목 6">
-            <a:extLst>
-              <a:ext uri="{FF2B5EF4-FFF2-40B4-BE49-F238E27FC236}">
-                <a16:creationId xmlns:a16="http://schemas.microsoft.com/office/drawing/2014/main" id="{4FD3139D-811E-04AA-6A66-753832B7229B}"/>
-              </a:ext>
-            </a:extLst>
-          </p:cNvPr>
-          <p:cNvSpPr>
-            <a:spLocks noGrp="1"/>
-          </p:cNvSpPr>
-          <p:nvPr>
-            <p:ph type="subTitle" idx="1"/>
+              <a:rPr lang="ko-KR" altLang="en-US" dirty="0"/>
+              <a:t>오류 검출 기법</a:t>
+            </a:r>
+          </a:p>
+        </p:txBody>
+      </p:sp>
+      <p:sp>
+        <p:nvSpPr>
+          <p:cNvPr id="3" name="내용 개체 틀 2">
+            <a:extLst>
+              <a:ext uri="{FF2B5EF4-FFF2-40B4-BE49-F238E27FC236}">
+                <a16:creationId xmlns:a16="http://schemas.microsoft.com/office/drawing/2014/main" id="{7C938EEB-EE89-1012-D537-3CF47016B2EB}"/>
+              </a:ext>
+            </a:extLst>
+          </p:cNvPr>
+          <p:cNvSpPr>
+            <a:spLocks noGrp="1"/>
+          </p:cNvSpPr>
+          <p:nvPr>
+            <p:ph idx="1"/>
           </p:nvPr>
         </p:nvSpPr>
         <p:spPr/>
@@ -5170,21 +5178,14 @@
           <a:bodyPr/>
           <a:lstStyle/>
           <a:p>
-            <a:r>
-              <a:rPr lang="en-US" altLang="ko-KR" dirty="0" err="1"/>
-              <a:t>etc</a:t>
-            </a:r>
-            <a:endParaRPr lang="ko-KR" altLang="en-US" dirty="0"/>
-          </a:p>
-          <a:p>
-            <a:endParaRPr lang="ko-KR" altLang="en-US" dirty="0"/>
+            <a:endParaRPr lang="ko-KR" altLang="en-US"/>
           </a:p>
         </p:txBody>
       </p:sp>
     </p:spTree>
     <p:extLst>
       <p:ext uri="{BB962C8B-B14F-4D97-AF65-F5344CB8AC3E}">
-        <p14:creationId xmlns:p14="http://schemas.microsoft.com/office/powerpoint/2010/main" val="1048703582"/>
+        <p14:creationId xmlns:p14="http://schemas.microsoft.com/office/powerpoint/2010/main" val="3731356846"/>
       </p:ext>
     </p:extLst>
   </p:cSld>
@@ -5216,7 +5217,7 @@
           <p:cNvPr id="2" name="제목 1">
             <a:extLst>
               <a:ext uri="{FF2B5EF4-FFF2-40B4-BE49-F238E27FC236}">
-                <a16:creationId xmlns:a16="http://schemas.microsoft.com/office/drawing/2014/main" id="{BC6501BE-E02F-1B4A-F30F-91305FC630E9}"/>
+                <a16:creationId xmlns:a16="http://schemas.microsoft.com/office/drawing/2014/main" id="{3967A198-0AB4-6BD8-3F9C-267A3D25065C}"/>
               </a:ext>
             </a:extLst>
           </p:cNvPr>
@@ -5233,10 +5234,9 @@
           <a:lstStyle/>
           <a:p>
             <a:r>
-              <a:rPr lang="en-US" altLang="ko-KR" dirty="0"/>
-              <a:t>Nagle Algorithm</a:t>
-            </a:r>
-            <a:endParaRPr lang="ko-KR" altLang="en-US" dirty="0"/>
+              <a:rPr lang="ko-KR" altLang="en-US" dirty="0"/>
+              <a:t>패리티</a:t>
+            </a:r>
           </a:p>
         </p:txBody>
       </p:sp>
@@ -5245,7 +5245,7 @@
           <p:cNvPr id="3" name="내용 개체 틀 2">
             <a:extLst>
               <a:ext uri="{FF2B5EF4-FFF2-40B4-BE49-F238E27FC236}">
-                <a16:creationId xmlns:a16="http://schemas.microsoft.com/office/drawing/2014/main" id="{D396FFDD-0C86-01AE-E9C4-9DCC94B3C367}"/>
+                <a16:creationId xmlns:a16="http://schemas.microsoft.com/office/drawing/2014/main" id="{C0F4B579-EF2D-4EA7-E2FE-2A0CF3099E41}"/>
               </a:ext>
             </a:extLst>
           </p:cNvPr>
@@ -5268,7 +5268,7 @@
     </p:spTree>
     <p:extLst>
       <p:ext uri="{BB962C8B-B14F-4D97-AF65-F5344CB8AC3E}">
-        <p14:creationId xmlns:p14="http://schemas.microsoft.com/office/powerpoint/2010/main" val="111331377"/>
+        <p14:creationId xmlns:p14="http://schemas.microsoft.com/office/powerpoint/2010/main" val="3589956062"/>
       </p:ext>
     </p:extLst>
   </p:cSld>
@@ -5387,7 +5387,7 @@
           <p:cNvPr id="2" name="제목 1">
             <a:extLst>
               <a:ext uri="{FF2B5EF4-FFF2-40B4-BE49-F238E27FC236}">
-                <a16:creationId xmlns:a16="http://schemas.microsoft.com/office/drawing/2014/main" id="{363AA976-92AE-4467-C91C-A8501FD9141D}"/>
+                <a16:creationId xmlns:a16="http://schemas.microsoft.com/office/drawing/2014/main" id="{9BA432E6-1B3B-A40C-8225-BB6082DF2834}"/>
               </a:ext>
             </a:extLst>
           </p:cNvPr>
@@ -5404,10 +5404,9 @@
           <a:lstStyle/>
           <a:p>
             <a:r>
-              <a:rPr lang="en-US" altLang="ko-KR" dirty="0"/>
-              <a:t>Event Select</a:t>
-            </a:r>
-            <a:endParaRPr lang="ko-KR" altLang="en-US" dirty="0"/>
+              <a:rPr lang="ko-KR" altLang="en-US" dirty="0"/>
+              <a:t>순환 중복 검사</a:t>
+            </a:r>
           </a:p>
         </p:txBody>
       </p:sp>
@@ -5416,7 +5415,7 @@
           <p:cNvPr id="3" name="내용 개체 틀 2">
             <a:extLst>
               <a:ext uri="{FF2B5EF4-FFF2-40B4-BE49-F238E27FC236}">
-                <a16:creationId xmlns:a16="http://schemas.microsoft.com/office/drawing/2014/main" id="{3363D9E5-BC97-1702-A8FD-353350EEFDEE}"/>
+                <a16:creationId xmlns:a16="http://schemas.microsoft.com/office/drawing/2014/main" id="{6E0724E2-29F6-92C8-C89F-B3357AFFF4DA}"/>
               </a:ext>
             </a:extLst>
           </p:cNvPr>
@@ -5439,7 +5438,7 @@
     </p:spTree>
     <p:extLst>
       <p:ext uri="{BB962C8B-B14F-4D97-AF65-F5344CB8AC3E}">
-        <p14:creationId xmlns:p14="http://schemas.microsoft.com/office/powerpoint/2010/main" val="2057317864"/>
+        <p14:creationId xmlns:p14="http://schemas.microsoft.com/office/powerpoint/2010/main" val="3701361518"/>
       </p:ext>
     </p:extLst>
   </p:cSld>
@@ -5471,7 +5470,7 @@
           <p:cNvPr id="2" name="제목 1">
             <a:extLst>
               <a:ext uri="{FF2B5EF4-FFF2-40B4-BE49-F238E27FC236}">
-                <a16:creationId xmlns:a16="http://schemas.microsoft.com/office/drawing/2014/main" id="{B34287C2-D33A-F3B2-7521-9C7D1FD8BCB3}"/>
+                <a16:creationId xmlns:a16="http://schemas.microsoft.com/office/drawing/2014/main" id="{7C5E6372-6F51-D715-A51A-C43B1229A03E}"/>
               </a:ext>
             </a:extLst>
           </p:cNvPr>
@@ -5489,7 +5488,7 @@
           <a:p>
             <a:r>
               <a:rPr lang="en-US" altLang="ko-KR" dirty="0"/>
-              <a:t>Stream vs Channel</a:t>
+              <a:t>MAC </a:t>
             </a:r>
             <a:endParaRPr lang="ko-KR" altLang="en-US" dirty="0"/>
           </a:p>
@@ -5500,7 +5499,7 @@
           <p:cNvPr id="3" name="내용 개체 틀 2">
             <a:extLst>
               <a:ext uri="{FF2B5EF4-FFF2-40B4-BE49-F238E27FC236}">
-                <a16:creationId xmlns:a16="http://schemas.microsoft.com/office/drawing/2014/main" id="{C3157A60-9634-F41F-D7BC-9B27B168F26A}"/>
+                <a16:creationId xmlns:a16="http://schemas.microsoft.com/office/drawing/2014/main" id="{F09D29DC-383F-D05F-59B2-85A0C3E26E57}"/>
               </a:ext>
             </a:extLst>
           </p:cNvPr>
@@ -5523,7 +5522,7 @@
     </p:spTree>
     <p:extLst>
       <p:ext uri="{BB962C8B-B14F-4D97-AF65-F5344CB8AC3E}">
-        <p14:creationId xmlns:p14="http://schemas.microsoft.com/office/powerpoint/2010/main" val="1819251778"/>
+        <p14:creationId xmlns:p14="http://schemas.microsoft.com/office/powerpoint/2010/main" val="4144508108"/>
       </p:ext>
     </p:extLst>
   </p:cSld>
@@ -5555,7 +5554,7 @@
           <p:cNvPr id="2" name="제목 1">
             <a:extLst>
               <a:ext uri="{FF2B5EF4-FFF2-40B4-BE49-F238E27FC236}">
-                <a16:creationId xmlns:a16="http://schemas.microsoft.com/office/drawing/2014/main" id="{20176F99-3C8A-809E-6FC3-B26F28250C46}"/>
+                <a16:creationId xmlns:a16="http://schemas.microsoft.com/office/drawing/2014/main" id="{1D6B4615-45F9-3447-143F-7346580D3382}"/>
               </a:ext>
             </a:extLst>
           </p:cNvPr>
@@ -5572,12 +5571,8 @@
           <a:lstStyle/>
           <a:p>
             <a:r>
-              <a:rPr lang="en-US" altLang="ko-KR" dirty="0" err="1"/>
-              <a:t>Epoll</a:t>
-            </a:r>
-            <a:r>
               <a:rPr lang="en-US" altLang="ko-KR" dirty="0"/>
-              <a:t> &amp; IOCP</a:t>
+              <a:t>ARP</a:t>
             </a:r>
             <a:endParaRPr lang="ko-KR" altLang="en-US" dirty="0"/>
           </a:p>
@@ -5588,7 +5583,7 @@
           <p:cNvPr id="3" name="내용 개체 틀 2">
             <a:extLst>
               <a:ext uri="{FF2B5EF4-FFF2-40B4-BE49-F238E27FC236}">
-                <a16:creationId xmlns:a16="http://schemas.microsoft.com/office/drawing/2014/main" id="{37E2FE29-152F-46FE-F49B-A0019E9200A8}"/>
+                <a16:creationId xmlns:a16="http://schemas.microsoft.com/office/drawing/2014/main" id="{5C0B9DB2-F183-2566-0808-897929F2D356}"/>
               </a:ext>
             </a:extLst>
           </p:cNvPr>
@@ -5611,7 +5606,7 @@
     </p:spTree>
     <p:extLst>
       <p:ext uri="{BB962C8B-B14F-4D97-AF65-F5344CB8AC3E}">
-        <p14:creationId xmlns:p14="http://schemas.microsoft.com/office/powerpoint/2010/main" val="473764033"/>
+        <p14:creationId xmlns:p14="http://schemas.microsoft.com/office/powerpoint/2010/main" val="949376813"/>
       </p:ext>
     </p:extLst>
   </p:cSld>
@@ -5643,7 +5638,7 @@
           <p:cNvPr id="2" name="제목 1">
             <a:extLst>
               <a:ext uri="{FF2B5EF4-FFF2-40B4-BE49-F238E27FC236}">
-                <a16:creationId xmlns:a16="http://schemas.microsoft.com/office/drawing/2014/main" id="{25E8D5A6-B796-DC28-600E-2686E9CD7809}"/>
+                <a16:creationId xmlns:a16="http://schemas.microsoft.com/office/drawing/2014/main" id="{FDA77268-47C0-5813-C4FA-D23815A5A1E0}"/>
               </a:ext>
             </a:extLst>
           </p:cNvPr>
@@ -5661,7 +5656,7 @@
           <a:p>
             <a:r>
               <a:rPr lang="en-US" altLang="ko-KR" dirty="0"/>
-              <a:t>TUN/TAP 1</a:t>
+              <a:t>Ethernet</a:t>
             </a:r>
             <a:endParaRPr lang="ko-KR" altLang="en-US" dirty="0"/>
           </a:p>
@@ -5672,7 +5667,7 @@
           <p:cNvPr id="3" name="내용 개체 틀 2">
             <a:extLst>
               <a:ext uri="{FF2B5EF4-FFF2-40B4-BE49-F238E27FC236}">
-                <a16:creationId xmlns:a16="http://schemas.microsoft.com/office/drawing/2014/main" id="{90C177AA-8EF6-701C-488E-E56FF857063A}"/>
+                <a16:creationId xmlns:a16="http://schemas.microsoft.com/office/drawing/2014/main" id="{352D1D30-E06A-3FDF-AC6B-E9045CCE7593}"/>
               </a:ext>
             </a:extLst>
           </p:cNvPr>
@@ -5695,7 +5690,7 @@
     </p:spTree>
     <p:extLst>
       <p:ext uri="{BB962C8B-B14F-4D97-AF65-F5344CB8AC3E}">
-        <p14:creationId xmlns:p14="http://schemas.microsoft.com/office/powerpoint/2010/main" val="1786579865"/>
+        <p14:creationId xmlns:p14="http://schemas.microsoft.com/office/powerpoint/2010/main" val="219724582"/>
       </p:ext>
     </p:extLst>
   </p:cSld>
@@ -5727,7 +5722,7 @@
           <p:cNvPr id="2" name="제목 1">
             <a:extLst>
               <a:ext uri="{FF2B5EF4-FFF2-40B4-BE49-F238E27FC236}">
-                <a16:creationId xmlns:a16="http://schemas.microsoft.com/office/drawing/2014/main" id="{7124890F-E612-A854-F026-E5C1F9CF1CDE}"/>
+                <a16:creationId xmlns:a16="http://schemas.microsoft.com/office/drawing/2014/main" id="{40EF865C-99C2-969A-33CB-633C1547A109}"/>
               </a:ext>
             </a:extLst>
           </p:cNvPr>
@@ -5744,10 +5739,9 @@
           <a:lstStyle/>
           <a:p>
             <a:r>
-              <a:rPr lang="en-US" altLang="ko-KR" dirty="0"/>
-              <a:t>TUN/TAP 2</a:t>
-            </a:r>
-            <a:endParaRPr lang="ko-KR" altLang="en-US" dirty="0"/>
+              <a:rPr lang="ko-KR" altLang="en-US" dirty="0"/>
+              <a:t>다중 접속 프로토콜</a:t>
+            </a:r>
           </a:p>
         </p:txBody>
       </p:sp>
@@ -5756,7 +5750,7 @@
           <p:cNvPr id="3" name="내용 개체 틀 2">
             <a:extLst>
               <a:ext uri="{FF2B5EF4-FFF2-40B4-BE49-F238E27FC236}">
-                <a16:creationId xmlns:a16="http://schemas.microsoft.com/office/drawing/2014/main" id="{4442398B-62D9-8CF3-BA55-50451CDB72B4}"/>
+                <a16:creationId xmlns:a16="http://schemas.microsoft.com/office/drawing/2014/main" id="{C40AC823-49BC-E0AC-7E87-EC7E94D52A4C}"/>
               </a:ext>
             </a:extLst>
           </p:cNvPr>
@@ -5779,7 +5773,7 @@
     </p:spTree>
     <p:extLst>
       <p:ext uri="{BB962C8B-B14F-4D97-AF65-F5344CB8AC3E}">
-        <p14:creationId xmlns:p14="http://schemas.microsoft.com/office/powerpoint/2010/main" val="4107051048"/>
+        <p14:creationId xmlns:p14="http://schemas.microsoft.com/office/powerpoint/2010/main" val="160347746"/>
       </p:ext>
     </p:extLst>
   </p:cSld>
@@ -5811,7 +5805,7 @@
           <p:cNvPr id="2" name="제목 1">
             <a:extLst>
               <a:ext uri="{FF2B5EF4-FFF2-40B4-BE49-F238E27FC236}">
-                <a16:creationId xmlns:a16="http://schemas.microsoft.com/office/drawing/2014/main" id="{6AD00367-9CAC-1553-8BB7-2F4BEB828885}"/>
+                <a16:creationId xmlns:a16="http://schemas.microsoft.com/office/drawing/2014/main" id="{0E6DF6C7-71C6-F41A-3C59-C6CDAEA1C5EB}"/>
               </a:ext>
             </a:extLst>
           </p:cNvPr>
@@ -5829,7 +5823,7 @@
           <a:p>
             <a:r>
               <a:rPr lang="en-US" altLang="ko-KR" dirty="0"/>
-              <a:t>Spoofing(Sniffing)</a:t>
+              <a:t>CSMA/CD</a:t>
             </a:r>
             <a:endParaRPr lang="ko-KR" altLang="en-US" dirty="0"/>
           </a:p>
@@ -5840,7 +5834,7 @@
           <p:cNvPr id="3" name="내용 개체 틀 2">
             <a:extLst>
               <a:ext uri="{FF2B5EF4-FFF2-40B4-BE49-F238E27FC236}">
-                <a16:creationId xmlns:a16="http://schemas.microsoft.com/office/drawing/2014/main" id="{CA81C18C-03D7-F69D-83CA-714BE4432D39}"/>
+                <a16:creationId xmlns:a16="http://schemas.microsoft.com/office/drawing/2014/main" id="{AD50170D-D0BB-69DC-D993-4EB7AE105F11}"/>
               </a:ext>
             </a:extLst>
           </p:cNvPr>
@@ -5863,7 +5857,7 @@
     </p:spTree>
     <p:extLst>
       <p:ext uri="{BB962C8B-B14F-4D97-AF65-F5344CB8AC3E}">
-        <p14:creationId xmlns:p14="http://schemas.microsoft.com/office/powerpoint/2010/main" val="3689989450"/>
+        <p14:creationId xmlns:p14="http://schemas.microsoft.com/office/powerpoint/2010/main" val="3938073431"/>
       </p:ext>
     </p:extLst>
   </p:cSld>
@@ -5895,7 +5889,7 @@
           <p:cNvPr id="2" name="제목 1">
             <a:extLst>
               <a:ext uri="{FF2B5EF4-FFF2-40B4-BE49-F238E27FC236}">
-                <a16:creationId xmlns:a16="http://schemas.microsoft.com/office/drawing/2014/main" id="{78EDA00F-5128-8D2A-4F79-1F08B70D48B5}"/>
+                <a16:creationId xmlns:a16="http://schemas.microsoft.com/office/drawing/2014/main" id="{13D882CC-F556-0303-363C-34AA8C763FD7}"/>
               </a:ext>
             </a:extLst>
           </p:cNvPr>
@@ -5913,7 +5907,7 @@
           <a:p>
             <a:r>
               <a:rPr lang="en-US" altLang="ko-KR" dirty="0"/>
-              <a:t>TCP Stomp, Hijacking</a:t>
+              <a:t>Switch</a:t>
             </a:r>
             <a:endParaRPr lang="ko-KR" altLang="en-US" dirty="0"/>
           </a:p>
@@ -5924,7 +5918,7 @@
           <p:cNvPr id="3" name="내용 개체 틀 2">
             <a:extLst>
               <a:ext uri="{FF2B5EF4-FFF2-40B4-BE49-F238E27FC236}">
-                <a16:creationId xmlns:a16="http://schemas.microsoft.com/office/drawing/2014/main" id="{6AFB9BCE-6A93-D0A2-0DF0-A104604E5CA7}"/>
+                <a16:creationId xmlns:a16="http://schemas.microsoft.com/office/drawing/2014/main" id="{B48C4B06-E5BA-C721-9E39-4C426074D86F}"/>
               </a:ext>
             </a:extLst>
           </p:cNvPr>
@@ -5947,91 +5941,7 @@
     </p:spTree>
     <p:extLst>
       <p:ext uri="{BB962C8B-B14F-4D97-AF65-F5344CB8AC3E}">
-        <p14:creationId xmlns:p14="http://schemas.microsoft.com/office/powerpoint/2010/main" val="3245566460"/>
-      </p:ext>
-    </p:extLst>
-  </p:cSld>
-  <p:clrMapOvr>
-    <a:masterClrMapping/>
-  </p:clrMapOvr>
-</p:sld>
-</file>
-
-<file path=ppt/slides/slide27.xml><?xml version="1.0" encoding="utf-8"?>
-<p:sld xmlns:a="http://schemas.openxmlformats.org/drawingml/2006/main" xmlns:r="http://schemas.openxmlformats.org/officeDocument/2006/relationships" xmlns:p="http://schemas.openxmlformats.org/presentationml/2006/main">
-  <p:cSld>
-    <p:spTree>
-      <p:nvGrpSpPr>
-        <p:cNvPr id="1" name=""/>
-        <p:cNvGrpSpPr/>
-        <p:nvPr/>
-      </p:nvGrpSpPr>
-      <p:grpSpPr>
-        <a:xfrm>
-          <a:off x="0" y="0"/>
-          <a:ext cx="0" cy="0"/>
-          <a:chOff x="0" y="0"/>
-          <a:chExt cx="0" cy="0"/>
-        </a:xfrm>
-      </p:grpSpPr>
-      <p:sp>
-        <p:nvSpPr>
-          <p:cNvPr id="2" name="제목 1">
-            <a:extLst>
-              <a:ext uri="{FF2B5EF4-FFF2-40B4-BE49-F238E27FC236}">
-                <a16:creationId xmlns:a16="http://schemas.microsoft.com/office/drawing/2014/main" id="{1BDB807B-18C2-4B1B-0F96-A57F10E248DC}"/>
-              </a:ext>
-            </a:extLst>
-          </p:cNvPr>
-          <p:cNvSpPr>
-            <a:spLocks noGrp="1"/>
-          </p:cNvSpPr>
-          <p:nvPr>
-            <p:ph type="title"/>
-          </p:nvPr>
-        </p:nvSpPr>
-        <p:spPr/>
-        <p:txBody>
-          <a:bodyPr/>
-          <a:lstStyle/>
-          <a:p>
-            <a:r>
-              <a:rPr lang="en-US" altLang="ko-KR" dirty="0"/>
-              <a:t>Web Shell(Reverse Shell)</a:t>
-            </a:r>
-            <a:endParaRPr lang="ko-KR" altLang="en-US" dirty="0"/>
-          </a:p>
-        </p:txBody>
-      </p:sp>
-      <p:sp>
-        <p:nvSpPr>
-          <p:cNvPr id="3" name="내용 개체 틀 2">
-            <a:extLst>
-              <a:ext uri="{FF2B5EF4-FFF2-40B4-BE49-F238E27FC236}">
-                <a16:creationId xmlns:a16="http://schemas.microsoft.com/office/drawing/2014/main" id="{8EEFA150-82F2-452D-BBEE-C772423621EF}"/>
-              </a:ext>
-            </a:extLst>
-          </p:cNvPr>
-          <p:cNvSpPr>
-            <a:spLocks noGrp="1"/>
-          </p:cNvSpPr>
-          <p:nvPr>
-            <p:ph idx="1"/>
-          </p:nvPr>
-        </p:nvSpPr>
-        <p:spPr/>
-        <p:txBody>
-          <a:bodyPr/>
-          <a:lstStyle/>
-          <a:p>
-            <a:endParaRPr lang="ko-KR" altLang="en-US" dirty="0"/>
-          </a:p>
-        </p:txBody>
-      </p:sp>
-    </p:spTree>
-    <p:extLst>
-      <p:ext uri="{BB962C8B-B14F-4D97-AF65-F5344CB8AC3E}">
-        <p14:creationId xmlns:p14="http://schemas.microsoft.com/office/powerpoint/2010/main" val="1562778887"/>
+        <p14:creationId xmlns:p14="http://schemas.microsoft.com/office/powerpoint/2010/main" val="2994615564"/>
       </p:ext>
     </p:extLst>
   </p:cSld>
@@ -6081,7 +5991,7 @@
           <a:p>
             <a:r>
               <a:rPr lang="en-US" altLang="ko-KR" dirty="0"/>
-              <a:t>Layer 2 </a:t>
+              <a:t>Layer 3 </a:t>
             </a:r>
             <a:endParaRPr lang="ko-KR" altLang="en-US" dirty="0"/>
           </a:p>
@@ -6110,22 +6020,14 @@
           <a:p>
             <a:r>
               <a:rPr lang="ko-KR" altLang="en-US" dirty="0"/>
-              <a:t>링크 계층</a:t>
+              <a:t>네트워크 계층</a:t>
             </a:r>
             <a:br>
               <a:rPr lang="en-US" altLang="ko-KR" dirty="0"/>
             </a:br>
             <a:r>
               <a:rPr lang="en-US" altLang="ko-KR" dirty="0"/>
-              <a:t>(</a:t>
-            </a:r>
-            <a:r>
-              <a:rPr lang="en-US" altLang="ko-KR" dirty="0" err="1"/>
-              <a:t>DataLink</a:t>
-            </a:r>
-            <a:r>
-              <a:rPr lang="en-US" altLang="ko-KR" dirty="0"/>
-              <a:t> Layer)</a:t>
+              <a:t>(Network Layer)</a:t>
             </a:r>
             <a:endParaRPr lang="ko-KR" altLang="en-US" dirty="0"/>
           </a:p>
@@ -6137,7 +6039,7 @@
     </p:spTree>
     <p:extLst>
       <p:ext uri="{BB962C8B-B14F-4D97-AF65-F5344CB8AC3E}">
-        <p14:creationId xmlns:p14="http://schemas.microsoft.com/office/powerpoint/2010/main" val="2005904950"/>
+        <p14:creationId xmlns:p14="http://schemas.microsoft.com/office/powerpoint/2010/main" val="2509722968"/>
       </p:ext>
     </p:extLst>
   </p:cSld>
@@ -6169,7 +6071,7 @@
           <p:cNvPr id="2" name="제목 1">
             <a:extLst>
               <a:ext uri="{FF2B5EF4-FFF2-40B4-BE49-F238E27FC236}">
-                <a16:creationId xmlns:a16="http://schemas.microsoft.com/office/drawing/2014/main" id="{21D78C88-D60B-A423-06DF-69795833D900}"/>
+                <a16:creationId xmlns:a16="http://schemas.microsoft.com/office/drawing/2014/main" id="{D989DB82-9F96-A5EB-55B4-642F1A7B21B5}"/>
               </a:ext>
             </a:extLst>
           </p:cNvPr>
@@ -6187,7 +6089,7 @@
           <a:p>
             <a:r>
               <a:rPr lang="en-US" altLang="ko-KR" dirty="0"/>
-              <a:t>Link </a:t>
+              <a:t>IP Datagram</a:t>
             </a:r>
             <a:endParaRPr lang="ko-KR" altLang="en-US" dirty="0"/>
           </a:p>
@@ -6198,7 +6100,7 @@
           <p:cNvPr id="3" name="내용 개체 틀 2">
             <a:extLst>
               <a:ext uri="{FF2B5EF4-FFF2-40B4-BE49-F238E27FC236}">
-                <a16:creationId xmlns:a16="http://schemas.microsoft.com/office/drawing/2014/main" id="{43D27213-823D-A893-0821-380722AF66E3}"/>
+                <a16:creationId xmlns:a16="http://schemas.microsoft.com/office/drawing/2014/main" id="{D2291C35-F0C5-F9B5-6039-B7B4AD94D60D}"/>
               </a:ext>
             </a:extLst>
           </p:cNvPr>
@@ -6221,7 +6123,7 @@
     </p:spTree>
     <p:extLst>
       <p:ext uri="{BB962C8B-B14F-4D97-AF65-F5344CB8AC3E}">
-        <p14:creationId xmlns:p14="http://schemas.microsoft.com/office/powerpoint/2010/main" val="762231998"/>
+        <p14:creationId xmlns:p14="http://schemas.microsoft.com/office/powerpoint/2010/main" val="3183895354"/>
       </p:ext>
     </p:extLst>
   </p:cSld>
@@ -6253,7 +6155,7 @@
           <p:cNvPr id="2" name="제목 1">
             <a:extLst>
               <a:ext uri="{FF2B5EF4-FFF2-40B4-BE49-F238E27FC236}">
-                <a16:creationId xmlns:a16="http://schemas.microsoft.com/office/drawing/2014/main" id="{B01BDAD8-3827-549E-A422-C5D3C18D92C8}"/>
+                <a16:creationId xmlns:a16="http://schemas.microsoft.com/office/drawing/2014/main" id="{0E181B45-9E1F-EAE1-462A-3DF457D31B9A}"/>
               </a:ext>
             </a:extLst>
           </p:cNvPr>
@@ -6270,9 +6172,10 @@
           <a:lstStyle/>
           <a:p>
             <a:r>
-              <a:rPr lang="ko-KR" altLang="en-US" dirty="0"/>
-              <a:t>오류 검출 기법</a:t>
-            </a:r>
+              <a:rPr lang="en-US" altLang="ko-KR" dirty="0"/>
+              <a:t>IPv4</a:t>
+            </a:r>
+            <a:endParaRPr lang="ko-KR" altLang="en-US" dirty="0"/>
           </a:p>
         </p:txBody>
       </p:sp>
@@ -6281,7 +6184,7 @@
           <p:cNvPr id="3" name="내용 개체 틀 2">
             <a:extLst>
               <a:ext uri="{FF2B5EF4-FFF2-40B4-BE49-F238E27FC236}">
-                <a16:creationId xmlns:a16="http://schemas.microsoft.com/office/drawing/2014/main" id="{7C938EEB-EE89-1012-D537-3CF47016B2EB}"/>
+                <a16:creationId xmlns:a16="http://schemas.microsoft.com/office/drawing/2014/main" id="{8D5DE25F-1285-0A89-FB09-95AF77B17ADB}"/>
               </a:ext>
             </a:extLst>
           </p:cNvPr>
@@ -6304,7 +6207,7 @@
     </p:spTree>
     <p:extLst>
       <p:ext uri="{BB962C8B-B14F-4D97-AF65-F5344CB8AC3E}">
-        <p14:creationId xmlns:p14="http://schemas.microsoft.com/office/powerpoint/2010/main" val="3731356846"/>
+        <p14:creationId xmlns:p14="http://schemas.microsoft.com/office/powerpoint/2010/main" val="3994509119"/>
       </p:ext>
     </p:extLst>
   </p:cSld>
@@ -6336,7 +6239,7 @@
           <p:cNvPr id="2" name="제목 1">
             <a:extLst>
               <a:ext uri="{FF2B5EF4-FFF2-40B4-BE49-F238E27FC236}">
-                <a16:creationId xmlns:a16="http://schemas.microsoft.com/office/drawing/2014/main" id="{3967A198-0AB4-6BD8-3F9C-267A3D25065C}"/>
+                <a16:creationId xmlns:a16="http://schemas.microsoft.com/office/drawing/2014/main" id="{37D4A492-B248-59C9-34A0-ACB9501F4BD9}"/>
               </a:ext>
             </a:extLst>
           </p:cNvPr>
@@ -6353,9 +6256,10 @@
           <a:lstStyle/>
           <a:p>
             <a:r>
-              <a:rPr lang="ko-KR" altLang="en-US" dirty="0"/>
-              <a:t>패리티</a:t>
-            </a:r>
+              <a:rPr lang="en-US" altLang="ko-KR" dirty="0"/>
+              <a:t>Subnet, Classful, CIDR</a:t>
+            </a:r>
+            <a:endParaRPr lang="ko-KR" altLang="en-US" dirty="0"/>
           </a:p>
         </p:txBody>
       </p:sp>
@@ -6364,7 +6268,7 @@
           <p:cNvPr id="3" name="내용 개체 틀 2">
             <a:extLst>
               <a:ext uri="{FF2B5EF4-FFF2-40B4-BE49-F238E27FC236}">
-                <a16:creationId xmlns:a16="http://schemas.microsoft.com/office/drawing/2014/main" id="{C0F4B579-EF2D-4EA7-E2FE-2A0CF3099E41}"/>
+                <a16:creationId xmlns:a16="http://schemas.microsoft.com/office/drawing/2014/main" id="{EB191E59-8D95-1147-96A8-3307FDED0792}"/>
               </a:ext>
             </a:extLst>
           </p:cNvPr>
@@ -6387,7 +6291,7 @@
     </p:spTree>
     <p:extLst>
       <p:ext uri="{BB962C8B-B14F-4D97-AF65-F5344CB8AC3E}">
-        <p14:creationId xmlns:p14="http://schemas.microsoft.com/office/powerpoint/2010/main" val="3589956062"/>
+        <p14:creationId xmlns:p14="http://schemas.microsoft.com/office/powerpoint/2010/main" val="4095649906"/>
       </p:ext>
     </p:extLst>
   </p:cSld>
@@ -6419,7 +6323,7 @@
           <p:cNvPr id="2" name="제목 1">
             <a:extLst>
               <a:ext uri="{FF2B5EF4-FFF2-40B4-BE49-F238E27FC236}">
-                <a16:creationId xmlns:a16="http://schemas.microsoft.com/office/drawing/2014/main" id="{9BA432E6-1B3B-A40C-8225-BB6082DF2834}"/>
+                <a16:creationId xmlns:a16="http://schemas.microsoft.com/office/drawing/2014/main" id="{ACD3445E-75EE-3CBD-8355-42F4C990B04E}"/>
               </a:ext>
             </a:extLst>
           </p:cNvPr>
@@ -6436,9 +6340,10 @@
           <a:lstStyle/>
           <a:p>
             <a:r>
-              <a:rPr lang="ko-KR" altLang="en-US" dirty="0"/>
-              <a:t>순환 중복 검사</a:t>
-            </a:r>
+              <a:rPr lang="en-US" altLang="ko-KR" dirty="0"/>
+              <a:t>DHCP</a:t>
+            </a:r>
+            <a:endParaRPr lang="ko-KR" altLang="en-US" dirty="0"/>
           </a:p>
         </p:txBody>
       </p:sp>
@@ -6447,7 +6352,7 @@
           <p:cNvPr id="3" name="내용 개체 틀 2">
             <a:extLst>
               <a:ext uri="{FF2B5EF4-FFF2-40B4-BE49-F238E27FC236}">
-                <a16:creationId xmlns:a16="http://schemas.microsoft.com/office/drawing/2014/main" id="{6E0724E2-29F6-92C8-C89F-B3357AFFF4DA}"/>
+                <a16:creationId xmlns:a16="http://schemas.microsoft.com/office/drawing/2014/main" id="{1736D7A4-70CF-B102-D6E2-DCBF1B7C2735}"/>
               </a:ext>
             </a:extLst>
           </p:cNvPr>
@@ -6470,7 +6375,7 @@
     </p:spTree>
     <p:extLst>
       <p:ext uri="{BB962C8B-B14F-4D97-AF65-F5344CB8AC3E}">
-        <p14:creationId xmlns:p14="http://schemas.microsoft.com/office/powerpoint/2010/main" val="3701361518"/>
+        <p14:creationId xmlns:p14="http://schemas.microsoft.com/office/powerpoint/2010/main" val="2020347262"/>
       </p:ext>
     </p:extLst>
   </p:cSld>
@@ -6502,7 +6407,7 @@
           <p:cNvPr id="2" name="제목 1">
             <a:extLst>
               <a:ext uri="{FF2B5EF4-FFF2-40B4-BE49-F238E27FC236}">
-                <a16:creationId xmlns:a16="http://schemas.microsoft.com/office/drawing/2014/main" id="{7C5E6372-6F51-D715-A51A-C43B1229A03E}"/>
+                <a16:creationId xmlns:a16="http://schemas.microsoft.com/office/drawing/2014/main" id="{069D763A-9085-A4A1-6C62-727F51E9678A}"/>
               </a:ext>
             </a:extLst>
           </p:cNvPr>
@@ -6520,7 +6425,7 @@
           <a:p>
             <a:r>
               <a:rPr lang="en-US" altLang="ko-KR" dirty="0"/>
-              <a:t>MAC </a:t>
+              <a:t>NAT</a:t>
             </a:r>
             <a:endParaRPr lang="ko-KR" altLang="en-US" dirty="0"/>
           </a:p>
@@ -6531,7 +6436,7 @@
           <p:cNvPr id="3" name="내용 개체 틀 2">
             <a:extLst>
               <a:ext uri="{FF2B5EF4-FFF2-40B4-BE49-F238E27FC236}">
-                <a16:creationId xmlns:a16="http://schemas.microsoft.com/office/drawing/2014/main" id="{F09D29DC-383F-D05F-59B2-85A0C3E26E57}"/>
+                <a16:creationId xmlns:a16="http://schemas.microsoft.com/office/drawing/2014/main" id="{DA3747CD-65C3-BA21-E67F-4929F34BD2EF}"/>
               </a:ext>
             </a:extLst>
           </p:cNvPr>
@@ -6554,7 +6459,7 @@
     </p:spTree>
     <p:extLst>
       <p:ext uri="{BB962C8B-B14F-4D97-AF65-F5344CB8AC3E}">
-        <p14:creationId xmlns:p14="http://schemas.microsoft.com/office/powerpoint/2010/main" val="4144508108"/>
+        <p14:creationId xmlns:p14="http://schemas.microsoft.com/office/powerpoint/2010/main" val="3674313477"/>
       </p:ext>
     </p:extLst>
   </p:cSld>
@@ -6586,7 +6491,7 @@
           <p:cNvPr id="2" name="제목 1">
             <a:extLst>
               <a:ext uri="{FF2B5EF4-FFF2-40B4-BE49-F238E27FC236}">
-                <a16:creationId xmlns:a16="http://schemas.microsoft.com/office/drawing/2014/main" id="{1D6B4615-45F9-3447-143F-7346580D3382}"/>
+                <a16:creationId xmlns:a16="http://schemas.microsoft.com/office/drawing/2014/main" id="{ED615AC7-2BA4-8056-6389-D398FFF072C0}"/>
               </a:ext>
             </a:extLst>
           </p:cNvPr>
@@ -6604,7 +6509,7 @@
           <a:p>
             <a:r>
               <a:rPr lang="en-US" altLang="ko-KR" dirty="0"/>
-              <a:t>ARP</a:t>
+              <a:t>NAPT, STUN, TURN</a:t>
             </a:r>
             <a:endParaRPr lang="ko-KR" altLang="en-US" dirty="0"/>
           </a:p>
@@ -6615,7 +6520,7 @@
           <p:cNvPr id="3" name="내용 개체 틀 2">
             <a:extLst>
               <a:ext uri="{FF2B5EF4-FFF2-40B4-BE49-F238E27FC236}">
-                <a16:creationId xmlns:a16="http://schemas.microsoft.com/office/drawing/2014/main" id="{5C0B9DB2-F183-2566-0808-897929F2D356}"/>
+                <a16:creationId xmlns:a16="http://schemas.microsoft.com/office/drawing/2014/main" id="{D9648417-8B24-D566-F96B-84D4FC787A1C}"/>
               </a:ext>
             </a:extLst>
           </p:cNvPr>
@@ -6638,7 +6543,7 @@
     </p:spTree>
     <p:extLst>
       <p:ext uri="{BB962C8B-B14F-4D97-AF65-F5344CB8AC3E}">
-        <p14:creationId xmlns:p14="http://schemas.microsoft.com/office/powerpoint/2010/main" val="949376813"/>
+        <p14:creationId xmlns:p14="http://schemas.microsoft.com/office/powerpoint/2010/main" val="828267970"/>
       </p:ext>
     </p:extLst>
   </p:cSld>

</xml_diff>

<commit_message>
Delete 4.pptx and fix 3.pptx
</commit_message>
<xml_diff>
--- a/3.pptx
+++ b/3.pptx
@@ -33,6 +33,10 @@
     <p:sldId id="301" r:id="rId27"/>
     <p:sldId id="339" r:id="rId28"/>
     <p:sldId id="305" r:id="rId29"/>
+    <p:sldId id="296" r:id="rId30"/>
+    <p:sldId id="306" r:id="rId31"/>
+    <p:sldId id="307" r:id="rId32"/>
+    <p:sldId id="308" r:id="rId33"/>
   </p:sldIdLst>
   <p:sldSz cx="12192000" cy="6858000"/>
   <p:notesSz cx="6858000" cy="9144000"/>
@@ -286,7 +290,7 @@
           <a:p>
             <a:fld id="{76969C88-B244-455D-A017-012B25B1ACDD}" type="datetimeFigureOut">
               <a:rPr lang="en-US" smtClean="0"/>
-              <a:t>2/6/2024</a:t>
+              <a:t>2/15/2024</a:t>
             </a:fld>
             <a:endParaRPr lang="en-US"/>
           </a:p>
@@ -500,7 +504,7 @@
           <a:p>
             <a:fld id="{76969C88-B244-455D-A017-012B25B1ACDD}" type="datetimeFigureOut">
               <a:rPr lang="en-US" smtClean="0"/>
-              <a:t>2/6/2024</a:t>
+              <a:t>2/15/2024</a:t>
             </a:fld>
             <a:endParaRPr lang="en-US"/>
           </a:p>
@@ -724,7 +728,7 @@
           <a:p>
             <a:fld id="{76969C88-B244-455D-A017-012B25B1ACDD}" type="datetimeFigureOut">
               <a:rPr lang="en-US" smtClean="0"/>
-              <a:t>2/6/2024</a:t>
+              <a:t>2/15/2024</a:t>
             </a:fld>
             <a:endParaRPr lang="en-US"/>
           </a:p>
@@ -964,7 +968,7 @@
           <a:p>
             <a:fld id="{76969C88-B244-455D-A017-012B25B1ACDD}" type="datetimeFigureOut">
               <a:rPr lang="en-US" smtClean="0"/>
-              <a:t>2/6/2024</a:t>
+              <a:t>2/15/2024</a:t>
             </a:fld>
             <a:endParaRPr lang="en-US" dirty="0"/>
           </a:p>
@@ -1185,7 +1189,7 @@
           <a:p>
             <a:fld id="{76969C88-B244-455D-A017-012B25B1ACDD}" type="datetimeFigureOut">
               <a:rPr lang="en-US" smtClean="0"/>
-              <a:t>2/6/2024</a:t>
+              <a:t>2/15/2024</a:t>
             </a:fld>
             <a:endParaRPr lang="en-US"/>
           </a:p>
@@ -1475,7 +1479,7 @@
           <a:p>
             <a:fld id="{76969C88-B244-455D-A017-012B25B1ACDD}" type="datetimeFigureOut">
               <a:rPr lang="en-US" smtClean="0"/>
-              <a:t>2/6/2024</a:t>
+              <a:t>2/15/2024</a:t>
             </a:fld>
             <a:endParaRPr lang="en-US"/>
           </a:p>
@@ -1833,7 +1837,7 @@
           <a:p>
             <a:fld id="{76969C88-B244-455D-A017-012B25B1ACDD}" type="datetimeFigureOut">
               <a:rPr lang="en-US" smtClean="0"/>
-              <a:t>2/6/2024</a:t>
+              <a:t>2/15/2024</a:t>
             </a:fld>
             <a:endParaRPr lang="en-US"/>
           </a:p>
@@ -1999,7 +2003,7 @@
           <a:p>
             <a:fld id="{76969C88-B244-455D-A017-012B25B1ACDD}" type="datetimeFigureOut">
               <a:rPr lang="en-US" smtClean="0"/>
-              <a:t>2/6/2024</a:t>
+              <a:t>2/15/2024</a:t>
             </a:fld>
             <a:endParaRPr lang="en-US"/>
           </a:p>
@@ -2058,7 +2062,7 @@
           <a:p>
             <a:fld id="{76969C88-B244-455D-A017-012B25B1ACDD}" type="datetimeFigureOut">
               <a:rPr lang="en-US" smtClean="0"/>
-              <a:t>2/6/2024</a:t>
+              <a:t>2/15/2024</a:t>
             </a:fld>
             <a:endParaRPr lang="en-US"/>
           </a:p>
@@ -2386,7 +2390,7 @@
           <a:p>
             <a:fld id="{76969C88-B244-455D-A017-012B25B1ACDD}" type="datetimeFigureOut">
               <a:rPr lang="en-US" smtClean="0"/>
-              <a:t>2/6/2024</a:t>
+              <a:t>2/15/2024</a:t>
             </a:fld>
             <a:endParaRPr lang="en-US"/>
           </a:p>
@@ -2693,7 +2697,7 @@
           <a:p>
             <a:fld id="{76969C88-B244-455D-A017-012B25B1ACDD}" type="datetimeFigureOut">
               <a:rPr lang="en-US" smtClean="0"/>
-              <a:t>2/6/2024</a:t>
+              <a:t>2/15/2024</a:t>
             </a:fld>
             <a:endParaRPr lang="en-US"/>
           </a:p>
@@ -3459,7 +3463,7 @@
             <a:fld id="{76969C88-B244-455D-A017-012B25B1ACDD}" type="datetimeFigureOut">
               <a:rPr lang="en-US" smtClean="0"/>
               <a:pPr/>
-              <a:t>2/6/2024</a:t>
+              <a:t>2/15/2024</a:t>
             </a:fld>
             <a:endParaRPr lang="en-US"/>
           </a:p>
@@ -9336,7 +9340,7 @@
         </p:spPr>
         <p:txBody>
           <a:bodyPr>
-            <a:normAutofit/>
+            <a:noAutofit/>
           </a:bodyPr>
           <a:lstStyle/>
           <a:p>
@@ -9348,56 +9352,56 @@
               <a:buAutoNum type="arabicPeriod"/>
             </a:pPr>
             <a:r>
-              <a:rPr lang="en-US" altLang="ko-KR" dirty="0"/>
+              <a:rPr lang="en-US" altLang="ko-KR" sz="1800" dirty="0"/>
               <a:t>Layer 3</a:t>
             </a:r>
             <a:br>
-              <a:rPr lang="en-US" altLang="ko-KR" dirty="0"/>
-            </a:br>
-            <a:r>
-              <a:rPr lang="en-US" altLang="ko-KR" dirty="0"/>
+              <a:rPr lang="en-US" altLang="ko-KR" sz="1800" dirty="0"/>
+            </a:br>
+            <a:r>
+              <a:rPr lang="en-US" altLang="ko-KR" sz="1600" dirty="0"/>
               <a:t>- IP</a:t>
             </a:r>
             <a:br>
-              <a:rPr lang="en-US" altLang="ko-KR" dirty="0"/>
-            </a:br>
-            <a:r>
-              <a:rPr lang="en-US" altLang="ko-KR" dirty="0"/>
+              <a:rPr lang="en-US" altLang="ko-KR" sz="1600" dirty="0"/>
+            </a:br>
+            <a:r>
+              <a:rPr lang="en-US" altLang="ko-KR" sz="1600" dirty="0"/>
               <a:t>- DHCP</a:t>
             </a:r>
             <a:br>
-              <a:rPr lang="en-US" altLang="ko-KR" dirty="0"/>
-            </a:br>
-            <a:r>
-              <a:rPr lang="en-US" altLang="ko-KR" dirty="0"/>
+              <a:rPr lang="en-US" altLang="ko-KR" sz="1600" dirty="0"/>
+            </a:br>
+            <a:r>
+              <a:rPr lang="en-US" altLang="ko-KR" sz="1600" dirty="0"/>
               <a:t>- NAT</a:t>
             </a:r>
             <a:br>
-              <a:rPr lang="en-US" altLang="ko-KR" dirty="0"/>
-            </a:br>
-            <a:r>
-              <a:rPr lang="en-US" altLang="ko-KR" dirty="0"/>
+              <a:rPr lang="en-US" altLang="ko-KR" sz="1600" dirty="0"/>
+            </a:br>
+            <a:r>
+              <a:rPr lang="en-US" altLang="ko-KR" sz="1600" dirty="0"/>
               <a:t>- Hole Punching</a:t>
             </a:r>
             <a:br>
-              <a:rPr lang="en-US" altLang="ko-KR" dirty="0"/>
-            </a:br>
-            <a:r>
-              <a:rPr lang="en-US" altLang="ko-KR" dirty="0"/>
+              <a:rPr lang="en-US" altLang="ko-KR" sz="1600" dirty="0"/>
+            </a:br>
+            <a:r>
+              <a:rPr lang="en-US" altLang="ko-KR" sz="1600" dirty="0"/>
               <a:t>- ICMP</a:t>
             </a:r>
             <a:br>
-              <a:rPr lang="en-US" altLang="ko-KR" dirty="0"/>
-            </a:br>
-            <a:r>
-              <a:rPr lang="en-US" altLang="ko-KR" dirty="0"/>
+              <a:rPr lang="en-US" altLang="ko-KR" sz="1600" dirty="0"/>
+            </a:br>
+            <a:r>
+              <a:rPr lang="en-US" altLang="ko-KR" sz="1600" dirty="0"/>
               <a:t>- Routing</a:t>
             </a:r>
             <a:br>
-              <a:rPr lang="en-US" altLang="ko-KR" dirty="0"/>
-            </a:br>
-            <a:r>
-              <a:rPr lang="en-US" altLang="ko-KR" dirty="0"/>
+              <a:rPr lang="en-US" altLang="ko-KR" sz="1600" dirty="0"/>
+            </a:br>
+            <a:r>
+              <a:rPr lang="en-US" altLang="ko-KR" sz="1600" dirty="0"/>
               <a:t>- BGP(AS)</a:t>
             </a:r>
           </a:p>
@@ -9410,44 +9414,78 @@
               <a:buAutoNum type="arabicPeriod"/>
             </a:pPr>
             <a:r>
-              <a:rPr lang="en-US" altLang="ko-KR" dirty="0"/>
+              <a:rPr lang="en-US" altLang="ko-KR" sz="1800" dirty="0"/>
               <a:t>Layer 2</a:t>
             </a:r>
             <a:br>
-              <a:rPr lang="en-US" altLang="ko-KR" dirty="0"/>
-            </a:br>
-            <a:r>
-              <a:rPr lang="en-US" altLang="ko-KR" dirty="0"/>
+              <a:rPr lang="en-US" altLang="ko-KR" sz="1800" dirty="0"/>
+            </a:br>
+            <a:r>
+              <a:rPr lang="en-US" altLang="ko-KR" sz="1600" dirty="0"/>
               <a:t>-</a:t>
             </a:r>
             <a:r>
-              <a:rPr lang="ko-KR" altLang="en-US" dirty="0"/>
+              <a:rPr lang="ko-KR" altLang="en-US" sz="1600" dirty="0"/>
               <a:t> </a:t>
             </a:r>
             <a:r>
-              <a:rPr lang="en-US" altLang="ko-KR" dirty="0"/>
+              <a:rPr lang="en-US" altLang="ko-KR" sz="1600" dirty="0"/>
               <a:t>Link</a:t>
             </a:r>
             <a:br>
-              <a:rPr lang="en-US" altLang="ko-KR" dirty="0"/>
-            </a:br>
-            <a:r>
-              <a:rPr lang="en-US" altLang="ko-KR" dirty="0"/>
+              <a:rPr lang="en-US" altLang="ko-KR" sz="1600" dirty="0"/>
+            </a:br>
+            <a:r>
+              <a:rPr lang="en-US" altLang="ko-KR" sz="1600" dirty="0"/>
               <a:t>- Error Detection</a:t>
             </a:r>
             <a:br>
-              <a:rPr lang="en-US" altLang="ko-KR" dirty="0"/>
-            </a:br>
-            <a:r>
-              <a:rPr lang="en-US" altLang="ko-KR" dirty="0"/>
+              <a:rPr lang="en-US" altLang="ko-KR" sz="1600" dirty="0"/>
+            </a:br>
+            <a:r>
+              <a:rPr lang="en-US" altLang="ko-KR" sz="1600" dirty="0"/>
               <a:t>- Ethernet</a:t>
             </a:r>
             <a:br>
-              <a:rPr lang="en-US" altLang="ko-KR" dirty="0"/>
-            </a:br>
-            <a:r>
-              <a:rPr lang="en-US" altLang="ko-KR" dirty="0"/>
+              <a:rPr lang="en-US" altLang="ko-KR" sz="1600" dirty="0"/>
+            </a:br>
+            <a:r>
+              <a:rPr lang="en-US" altLang="ko-KR" sz="1600" dirty="0"/>
               <a:t>- NIC, ARP, MAC</a:t>
+            </a:r>
+          </a:p>
+          <a:p>
+            <a:pPr marL="457200" indent="-457200">
+              <a:lnSpc>
+                <a:spcPct val="102000"/>
+              </a:lnSpc>
+              <a:buFont typeface="+mj-lt"/>
+              <a:buAutoNum type="arabicPeriod"/>
+            </a:pPr>
+            <a:r>
+              <a:rPr lang="en-US" altLang="ko-KR" sz="1800" dirty="0"/>
+              <a:t>Layer 1</a:t>
+            </a:r>
+            <a:br>
+              <a:rPr lang="en-US" altLang="ko-KR" sz="1800" dirty="0"/>
+            </a:br>
+            <a:r>
+              <a:rPr lang="en-US" altLang="ko-KR" sz="1600" dirty="0"/>
+              <a:t>- Transport mode</a:t>
+            </a:r>
+            <a:br>
+              <a:rPr lang="en-US" altLang="ko-KR" sz="1600" dirty="0"/>
+            </a:br>
+            <a:r>
+              <a:rPr lang="en-US" altLang="ko-KR" sz="1600" dirty="0"/>
+              <a:t>- Wireless LAN</a:t>
+            </a:r>
+            <a:br>
+              <a:rPr lang="en-US" altLang="ko-KR" sz="1600" dirty="0"/>
+            </a:br>
+            <a:r>
+              <a:rPr lang="en-US" altLang="ko-KR" sz="1600" dirty="0"/>
+              <a:t>- CSMA/CA</a:t>
             </a:r>
           </a:p>
         </p:txBody>
@@ -12340,6 +12378,104 @@
 </p:sld>
 </file>
 
+<file path=ppt/slides/slide29.xml><?xml version="1.0" encoding="utf-8"?>
+<p:sld xmlns:a="http://schemas.openxmlformats.org/drawingml/2006/main" xmlns:r="http://schemas.openxmlformats.org/officeDocument/2006/relationships" xmlns:p="http://schemas.openxmlformats.org/presentationml/2006/main">
+  <p:cSld>
+    <p:spTree>
+      <p:nvGrpSpPr>
+        <p:cNvPr id="1" name=""/>
+        <p:cNvGrpSpPr/>
+        <p:nvPr/>
+      </p:nvGrpSpPr>
+      <p:grpSpPr>
+        <a:xfrm>
+          <a:off x="0" y="0"/>
+          <a:ext cx="0" cy="0"/>
+          <a:chOff x="0" y="0"/>
+          <a:chExt cx="0" cy="0"/>
+        </a:xfrm>
+      </p:grpSpPr>
+      <p:sp>
+        <p:nvSpPr>
+          <p:cNvPr id="6" name="제목 5">
+            <a:extLst>
+              <a:ext uri="{FF2B5EF4-FFF2-40B4-BE49-F238E27FC236}">
+                <a16:creationId xmlns:a16="http://schemas.microsoft.com/office/drawing/2014/main" id="{F826D273-7332-66DA-9DCE-2EDFAAD4D461}"/>
+              </a:ext>
+            </a:extLst>
+          </p:cNvPr>
+          <p:cNvSpPr>
+            <a:spLocks noGrp="1"/>
+          </p:cNvSpPr>
+          <p:nvPr>
+            <p:ph type="ctrTitle"/>
+          </p:nvPr>
+        </p:nvSpPr>
+        <p:spPr/>
+        <p:txBody>
+          <a:bodyPr/>
+          <a:lstStyle/>
+          <a:p>
+            <a:r>
+              <a:rPr lang="en-US" altLang="ko-KR" dirty="0"/>
+              <a:t>Layer 1 </a:t>
+            </a:r>
+            <a:endParaRPr lang="ko-KR" altLang="en-US" dirty="0"/>
+          </a:p>
+        </p:txBody>
+      </p:sp>
+      <p:sp>
+        <p:nvSpPr>
+          <p:cNvPr id="7" name="부제목 6">
+            <a:extLst>
+              <a:ext uri="{FF2B5EF4-FFF2-40B4-BE49-F238E27FC236}">
+                <a16:creationId xmlns:a16="http://schemas.microsoft.com/office/drawing/2014/main" id="{4FD3139D-811E-04AA-6A66-753832B7229B}"/>
+              </a:ext>
+            </a:extLst>
+          </p:cNvPr>
+          <p:cNvSpPr>
+            <a:spLocks noGrp="1"/>
+          </p:cNvSpPr>
+          <p:nvPr>
+            <p:ph type="subTitle" idx="1"/>
+          </p:nvPr>
+        </p:nvSpPr>
+        <p:spPr/>
+        <p:txBody>
+          <a:bodyPr/>
+          <a:lstStyle/>
+          <a:p>
+            <a:r>
+              <a:rPr lang="ko-KR" altLang="en-US" dirty="0"/>
+              <a:t>물리 계층</a:t>
+            </a:r>
+            <a:br>
+              <a:rPr lang="en-US" altLang="ko-KR" dirty="0"/>
+            </a:br>
+            <a:r>
+              <a:rPr lang="en-US" altLang="ko-KR" dirty="0"/>
+              <a:t>(Physical Layer)</a:t>
+            </a:r>
+            <a:endParaRPr lang="ko-KR" altLang="en-US" dirty="0"/>
+          </a:p>
+          <a:p>
+            <a:endParaRPr lang="ko-KR" altLang="en-US" dirty="0"/>
+          </a:p>
+        </p:txBody>
+      </p:sp>
+    </p:spTree>
+    <p:extLst>
+      <p:ext uri="{BB962C8B-B14F-4D97-AF65-F5344CB8AC3E}">
+        <p14:creationId xmlns:p14="http://schemas.microsoft.com/office/powerpoint/2010/main" val="2904713976"/>
+      </p:ext>
+    </p:extLst>
+  </p:cSld>
+  <p:clrMapOvr>
+    <a:masterClrMapping/>
+  </p:clrMapOvr>
+</p:sld>
+</file>
+
 <file path=ppt/slides/slide3.xml><?xml version="1.0" encoding="utf-8"?>
 <p:sld xmlns:a="http://schemas.openxmlformats.org/drawingml/2006/main" xmlns:r="http://schemas.openxmlformats.org/officeDocument/2006/relationships" xmlns:p="http://schemas.openxmlformats.org/presentationml/2006/main">
   <p:cSld>
@@ -12429,6 +12565,1295 @@
     <p:extLst>
       <p:ext uri="{BB962C8B-B14F-4D97-AF65-F5344CB8AC3E}">
         <p14:creationId xmlns:p14="http://schemas.microsoft.com/office/powerpoint/2010/main" val="2509722968"/>
+      </p:ext>
+    </p:extLst>
+  </p:cSld>
+  <p:clrMapOvr>
+    <a:masterClrMapping/>
+  </p:clrMapOvr>
+</p:sld>
+</file>
+
+<file path=ppt/slides/slide30.xml><?xml version="1.0" encoding="utf-8"?>
+<p:sld xmlns:a="http://schemas.openxmlformats.org/drawingml/2006/main" xmlns:r="http://schemas.openxmlformats.org/officeDocument/2006/relationships" xmlns:p="http://schemas.openxmlformats.org/presentationml/2006/main">
+  <p:cSld>
+    <p:spTree>
+      <p:nvGrpSpPr>
+        <p:cNvPr id="1" name=""/>
+        <p:cNvGrpSpPr/>
+        <p:nvPr/>
+      </p:nvGrpSpPr>
+      <p:grpSpPr>
+        <a:xfrm>
+          <a:off x="0" y="0"/>
+          <a:ext cx="0" cy="0"/>
+          <a:chOff x="0" y="0"/>
+          <a:chExt cx="0" cy="0"/>
+        </a:xfrm>
+      </p:grpSpPr>
+      <p:sp>
+        <p:nvSpPr>
+          <p:cNvPr id="2" name="제목 1">
+            <a:extLst>
+              <a:ext uri="{FF2B5EF4-FFF2-40B4-BE49-F238E27FC236}">
+                <a16:creationId xmlns:a16="http://schemas.microsoft.com/office/drawing/2014/main" id="{0DD83260-336B-170C-E91B-F2E68EB53686}"/>
+              </a:ext>
+            </a:extLst>
+          </p:cNvPr>
+          <p:cNvSpPr>
+            <a:spLocks noGrp="1"/>
+          </p:cNvSpPr>
+          <p:nvPr>
+            <p:ph type="title"/>
+          </p:nvPr>
+        </p:nvSpPr>
+        <p:spPr/>
+        <p:txBody>
+          <a:bodyPr/>
+          <a:lstStyle/>
+          <a:p>
+            <a:r>
+              <a:rPr lang="ko-KR" altLang="en-US" dirty="0"/>
+              <a:t>전송모드</a:t>
+            </a:r>
+          </a:p>
+        </p:txBody>
+      </p:sp>
+      <p:sp>
+        <p:nvSpPr>
+          <p:cNvPr id="3" name="내용 개체 틀 2">
+            <a:extLst>
+              <a:ext uri="{FF2B5EF4-FFF2-40B4-BE49-F238E27FC236}">
+                <a16:creationId xmlns:a16="http://schemas.microsoft.com/office/drawing/2014/main" id="{F382FC43-75CE-4290-A052-49397A645387}"/>
+              </a:ext>
+            </a:extLst>
+          </p:cNvPr>
+          <p:cNvSpPr>
+            <a:spLocks noGrp="1"/>
+          </p:cNvSpPr>
+          <p:nvPr>
+            <p:ph idx="1"/>
+          </p:nvPr>
+        </p:nvSpPr>
+        <p:spPr>
+          <a:xfrm>
+            <a:off x="762000" y="1765139"/>
+            <a:ext cx="10668000" cy="5001421"/>
+          </a:xfrm>
+        </p:spPr>
+        <p:txBody>
+          <a:bodyPr/>
+          <a:lstStyle/>
+          <a:p>
+            <a:r>
+              <a:rPr lang="en-US" altLang="ko-KR" sz="1600" dirty="0"/>
+              <a:t>L1</a:t>
+            </a:r>
+            <a:r>
+              <a:rPr lang="ko-KR" altLang="en-US" sz="1600" dirty="0"/>
+              <a:t>은 물리적인 선 또는 전파 등의 통신을 정의한 계층입니다</a:t>
+            </a:r>
+            <a:br>
+              <a:rPr lang="en-US" altLang="ko-KR" sz="1600" dirty="0"/>
+            </a:br>
+            <a:r>
+              <a:rPr lang="ko-KR" altLang="en-US" sz="1600" dirty="0"/>
+              <a:t>이 때</a:t>
+            </a:r>
+            <a:r>
+              <a:rPr lang="en-US" altLang="ko-KR" sz="1600" dirty="0"/>
+              <a:t>, </a:t>
+            </a:r>
+            <a:r>
+              <a:rPr lang="ko-KR" altLang="en-US" sz="1600" dirty="0"/>
+              <a:t>선 또는 전파는 두 장치간 통신을 수행 할 때</a:t>
+            </a:r>
+            <a:br>
+              <a:rPr lang="en-US" altLang="ko-KR" sz="1600" dirty="0"/>
+            </a:br>
+            <a:r>
+              <a:rPr lang="ko-KR" altLang="en-US" sz="1600" dirty="0"/>
+              <a:t>각 장치는 수신과 송신이 모두 이루어져야 하기 때문에 두 방향으로 통신을 수행할 수 밖에 없습니다</a:t>
+            </a:r>
+            <a:endParaRPr lang="en-US" altLang="ko-KR" sz="1600" dirty="0"/>
+          </a:p>
+          <a:p>
+            <a:r>
+              <a:rPr lang="ko-KR" altLang="en-US" sz="1600" dirty="0"/>
+              <a:t>하지만</a:t>
+            </a:r>
+            <a:r>
+              <a:rPr lang="en-US" altLang="ko-KR" sz="1600" dirty="0"/>
+              <a:t>, </a:t>
+            </a:r>
+            <a:r>
+              <a:rPr lang="ko-KR" altLang="en-US" sz="1600" dirty="0"/>
+              <a:t>물리장치는 보통 하나의 선이나 같은 장소를 사용하는 방향이 다른 두 전파가 일반적이기 때문에</a:t>
+            </a:r>
+            <a:br>
+              <a:rPr lang="en-US" altLang="ko-KR" sz="1600" dirty="0"/>
+            </a:br>
+            <a:r>
+              <a:rPr lang="ko-KR" altLang="en-US" sz="1600" dirty="0"/>
+              <a:t>다양한 전송모드가 생길 수 있습니다</a:t>
+            </a:r>
+            <a:endParaRPr lang="en-US" altLang="ko-KR" sz="1600" dirty="0"/>
+          </a:p>
+          <a:p>
+            <a:pPr marL="342900" indent="-342900">
+              <a:buFont typeface="+mj-lt"/>
+              <a:buAutoNum type="arabicPeriod"/>
+            </a:pPr>
+            <a:r>
+              <a:rPr lang="en-US" altLang="ko-KR" sz="1600" dirty="0"/>
+              <a:t>Simplex:</a:t>
+            </a:r>
+            <a:r>
+              <a:rPr lang="ko-KR" altLang="en-US" sz="1600" dirty="0"/>
+              <a:t> 두 장치는 각자 다른 작업만을 수행하여</a:t>
+            </a:r>
+            <a:br>
+              <a:rPr lang="en-US" altLang="ko-KR" sz="1600" dirty="0"/>
+            </a:br>
+            <a:r>
+              <a:rPr lang="ko-KR" altLang="en-US" sz="1600" dirty="0"/>
+              <a:t>단 방향 통신을 하는 경우를 말합니다</a:t>
+            </a:r>
+            <a:endParaRPr lang="en-US" altLang="ko-KR" sz="1600" dirty="0"/>
+          </a:p>
+          <a:p>
+            <a:pPr marL="342900" indent="-342900">
+              <a:buFont typeface="+mj-lt"/>
+              <a:buAutoNum type="arabicPeriod"/>
+            </a:pPr>
+            <a:r>
+              <a:rPr lang="en-US" altLang="ko-KR" sz="1600" dirty="0"/>
+              <a:t>Half-Duplex: </a:t>
+            </a:r>
+            <a:r>
+              <a:rPr lang="ko-KR" altLang="en-US" sz="1600" dirty="0"/>
+              <a:t>두 장치는 모두 같은 작업을 수행하고</a:t>
+            </a:r>
+            <a:br>
+              <a:rPr lang="en-US" altLang="ko-KR" sz="1600" dirty="0"/>
+            </a:br>
+            <a:r>
+              <a:rPr lang="ko-KR" altLang="en-US" sz="1600" dirty="0"/>
+              <a:t>하나의 물리장치로부터 서로 간의 순서를 지켜</a:t>
+            </a:r>
+            <a:br>
+              <a:rPr lang="en-US" altLang="ko-KR" sz="1600" dirty="0"/>
+            </a:br>
+            <a:r>
+              <a:rPr lang="ko-KR" altLang="en-US" sz="1600" dirty="0"/>
+              <a:t>양 방향 통신을 하는 경우를 말합니다</a:t>
+            </a:r>
+            <a:br>
+              <a:rPr lang="en-US" altLang="ko-KR" sz="1600" dirty="0"/>
+            </a:br>
+            <a:r>
+              <a:rPr lang="ko-KR" altLang="en-US" sz="1600" dirty="0"/>
+              <a:t>다양한 방법이 존재하지만</a:t>
+            </a:r>
+            <a:r>
+              <a:rPr lang="en-US" altLang="ko-KR" sz="1600" dirty="0"/>
+              <a:t>(</a:t>
+            </a:r>
+            <a:r>
+              <a:rPr lang="ko-KR" altLang="en-US" sz="1600" dirty="0"/>
+              <a:t>무전기 등</a:t>
+            </a:r>
+            <a:r>
+              <a:rPr lang="en-US" altLang="ko-KR" sz="1600" dirty="0"/>
+              <a:t>),</a:t>
+            </a:r>
+            <a:br>
+              <a:rPr lang="en-US" altLang="ko-KR" sz="1600" dirty="0"/>
+            </a:br>
+            <a:r>
+              <a:rPr lang="ko-KR" altLang="en-US" sz="1600" dirty="0"/>
+              <a:t>대표적으로 </a:t>
+            </a:r>
+            <a:r>
+              <a:rPr lang="en-US" altLang="ko-KR" sz="1600" dirty="0"/>
+              <a:t>CSMA/CD, CSMA/CA</a:t>
+            </a:r>
+            <a:r>
+              <a:rPr lang="ko-KR" altLang="en-US" sz="1600" dirty="0"/>
+              <a:t>등이 있습니다</a:t>
+            </a:r>
+            <a:endParaRPr lang="en-US" altLang="ko-KR" sz="1600" dirty="0"/>
+          </a:p>
+          <a:p>
+            <a:pPr marL="342900" indent="-342900">
+              <a:buFont typeface="+mj-lt"/>
+              <a:buAutoNum type="arabicPeriod"/>
+            </a:pPr>
+            <a:r>
+              <a:rPr lang="en-US" altLang="ko-KR" sz="1600" dirty="0"/>
+              <a:t>Full-Duplex: </a:t>
+            </a:r>
+            <a:r>
+              <a:rPr lang="ko-KR" altLang="en-US" sz="1600" dirty="0"/>
+              <a:t>두 장치는 모두 같은 작업을 수행하고</a:t>
+            </a:r>
+            <a:br>
+              <a:rPr lang="en-US" altLang="ko-KR" sz="1600" dirty="0"/>
+            </a:br>
+            <a:r>
+              <a:rPr lang="ko-KR" altLang="en-US" sz="1600" dirty="0"/>
+              <a:t>두 개의 물리장치로부터 독립적인 송수신을 하여</a:t>
+            </a:r>
+            <a:br>
+              <a:rPr lang="en-US" altLang="ko-KR" sz="1600" dirty="0"/>
+            </a:br>
+            <a:r>
+              <a:rPr lang="ko-KR" altLang="en-US" sz="1600" dirty="0"/>
+              <a:t>양방향 통신을 하는 경우를 말합니다</a:t>
+            </a:r>
+            <a:br>
+              <a:rPr lang="en-US" altLang="ko-KR" sz="1600" dirty="0"/>
+            </a:br>
+            <a:r>
+              <a:rPr lang="ko-KR" altLang="en-US" sz="1600" dirty="0"/>
+              <a:t>오늘날 일반적인 랜 선들은 대부분 이 방식을 사용합니다</a:t>
+            </a:r>
+            <a:endParaRPr lang="en-US" altLang="ko-KR" sz="1600" dirty="0"/>
+          </a:p>
+        </p:txBody>
+      </p:sp>
+      <p:pic>
+        <p:nvPicPr>
+          <p:cNvPr id="5" name="그림 4" descr="스크린샷, 라인, 도표, 직사각형이(가) 표시된 사진&#10;&#10;자동 생성된 설명">
+            <a:extLst>
+              <a:ext uri="{FF2B5EF4-FFF2-40B4-BE49-F238E27FC236}">
+                <a16:creationId xmlns:a16="http://schemas.microsoft.com/office/drawing/2014/main" id="{3D9DF440-C580-0FFC-9E28-3884D072C00E}"/>
+              </a:ext>
+            </a:extLst>
+          </p:cNvPr>
+          <p:cNvPicPr>
+            <a:picLocks noChangeAspect="1"/>
+          </p:cNvPicPr>
+          <p:nvPr/>
+        </p:nvPicPr>
+        <p:blipFill>
+          <a:blip r:embed="rId2">
+            <a:extLst>
+              <a:ext uri="{28A0092B-C50C-407E-A947-70E740481C1C}">
+                <a14:useLocalDpi xmlns:a14="http://schemas.microsoft.com/office/drawing/2010/main" val="0"/>
+              </a:ext>
+            </a:extLst>
+          </a:blip>
+          <a:stretch>
+            <a:fillRect/>
+          </a:stretch>
+        </p:blipFill>
+        <p:spPr>
+          <a:xfrm>
+            <a:off x="6729548" y="3191462"/>
+            <a:ext cx="5376454" cy="1016416"/>
+          </a:xfrm>
+          <a:prstGeom prst="rect">
+            <a:avLst/>
+          </a:prstGeom>
+        </p:spPr>
+      </p:pic>
+      <p:pic>
+        <p:nvPicPr>
+          <p:cNvPr id="7" name="그림 6" descr="도표, 라인, 텍스트, 스크린샷이(가) 표시된 사진&#10;&#10;자동 생성된 설명">
+            <a:extLst>
+              <a:ext uri="{FF2B5EF4-FFF2-40B4-BE49-F238E27FC236}">
+                <a16:creationId xmlns:a16="http://schemas.microsoft.com/office/drawing/2014/main" id="{C0B98A30-C924-26E9-2A3D-FEBE01E8BA86}"/>
+              </a:ext>
+            </a:extLst>
+          </p:cNvPr>
+          <p:cNvPicPr>
+            <a:picLocks noChangeAspect="1"/>
+          </p:cNvPicPr>
+          <p:nvPr/>
+        </p:nvPicPr>
+        <p:blipFill>
+          <a:blip r:embed="rId3">
+            <a:extLst>
+              <a:ext uri="{28A0092B-C50C-407E-A947-70E740481C1C}">
+                <a14:useLocalDpi xmlns:a14="http://schemas.microsoft.com/office/drawing/2010/main" val="0"/>
+              </a:ext>
+            </a:extLst>
+          </a:blip>
+          <a:stretch>
+            <a:fillRect/>
+          </a:stretch>
+        </p:blipFill>
+        <p:spPr>
+          <a:xfrm>
+            <a:off x="6728793" y="4220940"/>
+            <a:ext cx="5376454" cy="1283017"/>
+          </a:xfrm>
+          <a:prstGeom prst="rect">
+            <a:avLst/>
+          </a:prstGeom>
+        </p:spPr>
+      </p:pic>
+      <p:pic>
+        <p:nvPicPr>
+          <p:cNvPr id="9" name="그림 8" descr="라인, 텍스트, 스크린샷, 직사각형이(가) 표시된 사진&#10;&#10;자동 생성된 설명">
+            <a:extLst>
+              <a:ext uri="{FF2B5EF4-FFF2-40B4-BE49-F238E27FC236}">
+                <a16:creationId xmlns:a16="http://schemas.microsoft.com/office/drawing/2014/main" id="{867FDA75-EACA-A71A-DFE9-C8B46842BE8E}"/>
+              </a:ext>
+            </a:extLst>
+          </p:cNvPr>
+          <p:cNvPicPr>
+            <a:picLocks noChangeAspect="1"/>
+          </p:cNvPicPr>
+          <p:nvPr/>
+        </p:nvPicPr>
+        <p:blipFill>
+          <a:blip r:embed="rId4">
+            <a:extLst>
+              <a:ext uri="{28A0092B-C50C-407E-A947-70E740481C1C}">
+                <a14:useLocalDpi xmlns:a14="http://schemas.microsoft.com/office/drawing/2010/main" val="0"/>
+              </a:ext>
+            </a:extLst>
+          </a:blip>
+          <a:stretch>
+            <a:fillRect/>
+          </a:stretch>
+        </p:blipFill>
+        <p:spPr>
+          <a:xfrm>
+            <a:off x="6728791" y="5517020"/>
+            <a:ext cx="5376455" cy="1171934"/>
+          </a:xfrm>
+          <a:prstGeom prst="rect">
+            <a:avLst/>
+          </a:prstGeom>
+        </p:spPr>
+      </p:pic>
+      <p:pic>
+        <p:nvPicPr>
+          <p:cNvPr id="10" name="그림 9" descr="스크린샷, 라인, 도표, 직사각형이(가) 표시된 사진&#10;&#10;자동 생성된 설명">
+            <a:extLst>
+              <a:ext uri="{FF2B5EF4-FFF2-40B4-BE49-F238E27FC236}">
+                <a16:creationId xmlns:a16="http://schemas.microsoft.com/office/drawing/2014/main" id="{0BF602EF-74A4-6205-214C-AA941408B100}"/>
+              </a:ext>
+            </a:extLst>
+          </p:cNvPr>
+          <p:cNvPicPr>
+            <a:picLocks noChangeAspect="1"/>
+          </p:cNvPicPr>
+          <p:nvPr/>
+        </p:nvPicPr>
+        <p:blipFill>
+          <a:blip r:embed="rId2">
+            <a:extLst>
+              <a:ext uri="{28A0092B-C50C-407E-A947-70E740481C1C}">
+                <a14:useLocalDpi xmlns:a14="http://schemas.microsoft.com/office/drawing/2010/main" val="0"/>
+              </a:ext>
+            </a:extLst>
+          </a:blip>
+          <a:stretch>
+            <a:fillRect/>
+          </a:stretch>
+        </p:blipFill>
+        <p:spPr>
+          <a:xfrm>
+            <a:off x="6768735" y="3191462"/>
+            <a:ext cx="5376454" cy="1016416"/>
+          </a:xfrm>
+          <a:prstGeom prst="rect">
+            <a:avLst/>
+          </a:prstGeom>
+        </p:spPr>
+      </p:pic>
+      <p:pic>
+        <p:nvPicPr>
+          <p:cNvPr id="11" name="그림 10" descr="도표, 라인, 텍스트, 스크린샷이(가) 표시된 사진&#10;&#10;자동 생성된 설명">
+            <a:extLst>
+              <a:ext uri="{FF2B5EF4-FFF2-40B4-BE49-F238E27FC236}">
+                <a16:creationId xmlns:a16="http://schemas.microsoft.com/office/drawing/2014/main" id="{2ABA417C-3314-B0D0-A605-891E11849515}"/>
+              </a:ext>
+            </a:extLst>
+          </p:cNvPr>
+          <p:cNvPicPr>
+            <a:picLocks noChangeAspect="1"/>
+          </p:cNvPicPr>
+          <p:nvPr/>
+        </p:nvPicPr>
+        <p:blipFill>
+          <a:blip r:embed="rId3">
+            <a:extLst>
+              <a:ext uri="{28A0092B-C50C-407E-A947-70E740481C1C}">
+                <a14:useLocalDpi xmlns:a14="http://schemas.microsoft.com/office/drawing/2010/main" val="0"/>
+              </a:ext>
+            </a:extLst>
+          </a:blip>
+          <a:stretch>
+            <a:fillRect/>
+          </a:stretch>
+        </p:blipFill>
+        <p:spPr>
+          <a:xfrm>
+            <a:off x="6767980" y="4220940"/>
+            <a:ext cx="5376454" cy="1283017"/>
+          </a:xfrm>
+          <a:prstGeom prst="rect">
+            <a:avLst/>
+          </a:prstGeom>
+        </p:spPr>
+      </p:pic>
+      <p:pic>
+        <p:nvPicPr>
+          <p:cNvPr id="12" name="그림 11" descr="라인, 텍스트, 스크린샷, 직사각형이(가) 표시된 사진&#10;&#10;자동 생성된 설명">
+            <a:extLst>
+              <a:ext uri="{FF2B5EF4-FFF2-40B4-BE49-F238E27FC236}">
+                <a16:creationId xmlns:a16="http://schemas.microsoft.com/office/drawing/2014/main" id="{8301DA9C-F064-9ED0-A099-B0411BC57161}"/>
+              </a:ext>
+            </a:extLst>
+          </p:cNvPr>
+          <p:cNvPicPr>
+            <a:picLocks noChangeAspect="1"/>
+          </p:cNvPicPr>
+          <p:nvPr/>
+        </p:nvPicPr>
+        <p:blipFill>
+          <a:blip r:embed="rId4">
+            <a:extLst>
+              <a:ext uri="{28A0092B-C50C-407E-A947-70E740481C1C}">
+                <a14:useLocalDpi xmlns:a14="http://schemas.microsoft.com/office/drawing/2010/main" val="0"/>
+              </a:ext>
+            </a:extLst>
+          </a:blip>
+          <a:stretch>
+            <a:fillRect/>
+          </a:stretch>
+        </p:blipFill>
+        <p:spPr>
+          <a:xfrm>
+            <a:off x="6767978" y="5517020"/>
+            <a:ext cx="5376455" cy="1171934"/>
+          </a:xfrm>
+          <a:prstGeom prst="rect">
+            <a:avLst/>
+          </a:prstGeom>
+        </p:spPr>
+      </p:pic>
+    </p:spTree>
+    <p:extLst>
+      <p:ext uri="{BB962C8B-B14F-4D97-AF65-F5344CB8AC3E}">
+        <p14:creationId xmlns:p14="http://schemas.microsoft.com/office/powerpoint/2010/main" val="306307204"/>
+      </p:ext>
+    </p:extLst>
+  </p:cSld>
+  <p:clrMapOvr>
+    <a:masterClrMapping/>
+  </p:clrMapOvr>
+</p:sld>
+</file>
+
+<file path=ppt/slides/slide31.xml><?xml version="1.0" encoding="utf-8"?>
+<p:sld xmlns:a="http://schemas.openxmlformats.org/drawingml/2006/main" xmlns:r="http://schemas.openxmlformats.org/officeDocument/2006/relationships" xmlns:p="http://schemas.openxmlformats.org/presentationml/2006/main">
+  <p:cSld>
+    <p:spTree>
+      <p:nvGrpSpPr>
+        <p:cNvPr id="1" name=""/>
+        <p:cNvGrpSpPr/>
+        <p:nvPr/>
+      </p:nvGrpSpPr>
+      <p:grpSpPr>
+        <a:xfrm>
+          <a:off x="0" y="0"/>
+          <a:ext cx="0" cy="0"/>
+          <a:chOff x="0" y="0"/>
+          <a:chExt cx="0" cy="0"/>
+        </a:xfrm>
+      </p:grpSpPr>
+      <p:sp>
+        <p:nvSpPr>
+          <p:cNvPr id="2" name="제목 1">
+            <a:extLst>
+              <a:ext uri="{FF2B5EF4-FFF2-40B4-BE49-F238E27FC236}">
+                <a16:creationId xmlns:a16="http://schemas.microsoft.com/office/drawing/2014/main" id="{DD6320BC-53F4-CE76-EA60-9FDA50B62C12}"/>
+              </a:ext>
+            </a:extLst>
+          </p:cNvPr>
+          <p:cNvSpPr>
+            <a:spLocks noGrp="1"/>
+          </p:cNvSpPr>
+          <p:nvPr>
+            <p:ph type="title"/>
+          </p:nvPr>
+        </p:nvSpPr>
+        <p:spPr/>
+        <p:txBody>
+          <a:bodyPr/>
+          <a:lstStyle/>
+          <a:p>
+            <a:r>
+              <a:rPr lang="en-US" altLang="ko-KR" dirty="0"/>
+              <a:t>Wireless LAN</a:t>
+            </a:r>
+            <a:endParaRPr lang="ko-KR" altLang="en-US" dirty="0"/>
+          </a:p>
+        </p:txBody>
+      </p:sp>
+      <p:sp>
+        <p:nvSpPr>
+          <p:cNvPr id="3" name="내용 개체 틀 2">
+            <a:extLst>
+              <a:ext uri="{FF2B5EF4-FFF2-40B4-BE49-F238E27FC236}">
+                <a16:creationId xmlns:a16="http://schemas.microsoft.com/office/drawing/2014/main" id="{953E09DC-3047-015A-89FB-7EC983ACD03B}"/>
+              </a:ext>
+            </a:extLst>
+          </p:cNvPr>
+          <p:cNvSpPr>
+            <a:spLocks noGrp="1"/>
+          </p:cNvSpPr>
+          <p:nvPr>
+            <p:ph idx="1"/>
+          </p:nvPr>
+        </p:nvSpPr>
+        <p:spPr>
+          <a:xfrm>
+            <a:off x="761999" y="1765139"/>
+            <a:ext cx="10759441" cy="5030918"/>
+          </a:xfrm>
+        </p:spPr>
+        <p:txBody>
+          <a:bodyPr/>
+          <a:lstStyle/>
+          <a:p>
+            <a:r>
+              <a:rPr lang="ko-KR" altLang="en-US" sz="1600" dirty="0"/>
+              <a:t>오늘날 통신은 </a:t>
+            </a:r>
+            <a:r>
+              <a:rPr lang="en-US" altLang="ko-KR" sz="1600" dirty="0"/>
+              <a:t>LAN </a:t>
+            </a:r>
+            <a:r>
+              <a:rPr lang="ko-KR" altLang="en-US" sz="1600" dirty="0"/>
+              <a:t>선을 사용한 컴퓨터보다도</a:t>
+            </a:r>
+            <a:r>
+              <a:rPr lang="en-US" altLang="ko-KR" sz="1600" dirty="0"/>
+              <a:t> </a:t>
+            </a:r>
+            <a:r>
+              <a:rPr lang="ko-KR" altLang="en-US" sz="1600" dirty="0"/>
+              <a:t>스마트폰</a:t>
+            </a:r>
+            <a:r>
+              <a:rPr lang="en-US" altLang="ko-KR" sz="1600" dirty="0"/>
+              <a:t>, </a:t>
+            </a:r>
+            <a:r>
+              <a:rPr lang="ko-KR" altLang="en-US" sz="1600" dirty="0"/>
+              <a:t>태블릿 등의 무선을 더 많이 사용하는 추세입니다</a:t>
+            </a:r>
+            <a:br>
+              <a:rPr lang="en-US" altLang="ko-KR" sz="1600" dirty="0"/>
+            </a:br>
+            <a:r>
+              <a:rPr lang="ko-KR" altLang="en-US" sz="1600" dirty="0"/>
+              <a:t>무선 통신은 </a:t>
+            </a:r>
+            <a:r>
+              <a:rPr lang="en-US" altLang="ko-KR" sz="1600" dirty="0"/>
+              <a:t>Wi-Fi 802.11 wireless LAN </a:t>
+            </a:r>
+            <a:r>
+              <a:rPr lang="ko-KR" altLang="en-US" sz="1600" dirty="0"/>
+              <a:t>표준을 사용하고</a:t>
+            </a:r>
+            <a:r>
+              <a:rPr lang="en-US" altLang="ko-KR" sz="1600" dirty="0"/>
+              <a:t>,</a:t>
+            </a:r>
+            <a:br>
+              <a:rPr lang="en-US" altLang="ko-KR" sz="1600" dirty="0"/>
+            </a:br>
+            <a:r>
+              <a:rPr lang="en-US" altLang="ko-KR" sz="1600" dirty="0"/>
+              <a:t>2G, 3G, 4G(LTE), 5G, 6G</a:t>
+            </a:r>
+            <a:r>
+              <a:rPr lang="ko-KR" altLang="en-US" sz="1600" dirty="0"/>
+              <a:t>들은 대표적인 </a:t>
+            </a:r>
+            <a:r>
+              <a:rPr lang="en-US" altLang="ko-KR" sz="1600" dirty="0"/>
+              <a:t>IEEE 802.11(Wi-Fi)</a:t>
+            </a:r>
+            <a:r>
+              <a:rPr lang="ko-KR" altLang="en-US" sz="1600" dirty="0"/>
+              <a:t>표준 기술들입니다</a:t>
+            </a:r>
+            <a:endParaRPr lang="en-US" altLang="ko-KR" sz="1600" dirty="0"/>
+          </a:p>
+          <a:p>
+            <a:r>
+              <a:rPr lang="ko-KR" altLang="en-US" sz="1600" dirty="0"/>
+              <a:t>무선 통신은 여러 대의 무선 스테이션</a:t>
+            </a:r>
+            <a:r>
+              <a:rPr lang="en-US" altLang="ko-KR" sz="1600" dirty="0"/>
+              <a:t>(</a:t>
+            </a:r>
+            <a:r>
+              <a:rPr lang="ko-KR" altLang="en-US" sz="1600" dirty="0"/>
+              <a:t>무선 단말기</a:t>
+            </a:r>
+            <a:r>
+              <a:rPr lang="en-US" altLang="ko-KR" sz="1600" dirty="0"/>
+              <a:t>)</a:t>
+            </a:r>
+            <a:r>
+              <a:rPr lang="ko-KR" altLang="en-US" sz="1600" dirty="0"/>
+              <a:t>와 하나의 무선 기지국</a:t>
+            </a:r>
+            <a:r>
+              <a:rPr lang="en-US" altLang="ko-KR" sz="1600" dirty="0"/>
+              <a:t>(</a:t>
+            </a:r>
+            <a:r>
+              <a:rPr lang="ko-KR" altLang="en-US" sz="1600" dirty="0"/>
+              <a:t>무선 신호기</a:t>
+            </a:r>
+            <a:r>
+              <a:rPr lang="en-US" altLang="ko-KR" sz="1600" dirty="0"/>
+              <a:t>)</a:t>
+            </a:r>
+            <a:r>
+              <a:rPr lang="ko-KR" altLang="en-US" sz="1600" dirty="0"/>
+              <a:t>가 있고</a:t>
+            </a:r>
+            <a:r>
+              <a:rPr lang="en-US" altLang="ko-KR" sz="1600" dirty="0"/>
+              <a:t>,</a:t>
+            </a:r>
+            <a:br>
+              <a:rPr lang="en-US" altLang="ko-KR" sz="1600" dirty="0"/>
+            </a:br>
+            <a:r>
+              <a:rPr lang="ko-KR" altLang="en-US" sz="1600" dirty="0"/>
+              <a:t>상호 연결된 해당 그룹을 </a:t>
+            </a:r>
+            <a:r>
+              <a:rPr lang="en-US" altLang="ko-KR" sz="1600" dirty="0"/>
+              <a:t>BSS(Basic Service Set)</a:t>
+            </a:r>
+            <a:r>
+              <a:rPr lang="ko-KR" altLang="en-US" sz="1600" dirty="0"/>
+              <a:t>라고 표현합니다</a:t>
+            </a:r>
+            <a:endParaRPr lang="en-US" altLang="ko-KR" sz="1600" dirty="0"/>
+          </a:p>
+          <a:p>
+            <a:r>
+              <a:rPr lang="ko-KR" altLang="en-US" sz="1600" dirty="0"/>
+              <a:t>하나의 무선 신호기는 </a:t>
+            </a:r>
+            <a:r>
+              <a:rPr lang="en-US" altLang="ko-KR" sz="1600" dirty="0"/>
+              <a:t>SSID(Service Set Identifier)</a:t>
+            </a:r>
+            <a:r>
+              <a:rPr lang="ko-KR" altLang="en-US" sz="1600" dirty="0"/>
+              <a:t>를 가지고 있으며</a:t>
+            </a:r>
+            <a:r>
+              <a:rPr lang="en-US" altLang="ko-KR" sz="1600" dirty="0"/>
+              <a:t>,</a:t>
+            </a:r>
+            <a:br>
+              <a:rPr lang="en-US" altLang="ko-KR" sz="1600" dirty="0"/>
+            </a:br>
+            <a:r>
+              <a:rPr lang="ko-KR" altLang="en-US" sz="1600" dirty="0"/>
+              <a:t>여러 대의 무선 단말기는 </a:t>
+            </a:r>
+            <a:r>
+              <a:rPr lang="en-US" altLang="ko-KR" sz="1600" dirty="0"/>
+              <a:t>MAC</a:t>
+            </a:r>
+            <a:r>
+              <a:rPr lang="ko-KR" altLang="en-US" sz="1600" dirty="0"/>
+              <a:t>주소를 가지고</a:t>
+            </a:r>
+            <a:r>
+              <a:rPr lang="en-US" altLang="ko-KR" sz="1600" dirty="0"/>
+              <a:t>, </a:t>
+            </a:r>
+            <a:r>
+              <a:rPr lang="ko-KR" altLang="en-US" sz="1600" dirty="0"/>
+              <a:t>신호기가 </a:t>
+            </a:r>
+            <a:r>
+              <a:rPr lang="en-US" altLang="ko-KR" sz="1600" dirty="0"/>
+              <a:t>SSID-MAC </a:t>
+            </a:r>
+            <a:r>
+              <a:rPr lang="ko-KR" altLang="en-US" sz="1600" dirty="0"/>
+              <a:t>조합의 비컨 프레임</a:t>
+            </a:r>
+            <a:r>
+              <a:rPr lang="en-US" altLang="ko-KR" sz="1600" dirty="0"/>
+              <a:t>(beacon</a:t>
+            </a:r>
+            <a:r>
+              <a:rPr lang="ko-KR" altLang="en-US" sz="1600" dirty="0"/>
+              <a:t> </a:t>
+            </a:r>
+            <a:r>
+              <a:rPr lang="en-US" altLang="ko-KR" sz="1600" dirty="0"/>
+              <a:t>frame)</a:t>
+            </a:r>
+            <a:r>
+              <a:rPr lang="ko-KR" altLang="en-US" sz="1600" dirty="0"/>
+              <a:t>을</a:t>
+            </a:r>
+            <a:br>
+              <a:rPr lang="en-US" altLang="ko-KR" sz="1600" dirty="0"/>
+            </a:br>
+            <a:r>
+              <a:rPr lang="ko-KR" altLang="en-US" sz="1600" dirty="0"/>
+              <a:t>주기적으로 전송하여 단말기가 조합에 맞으면 주고 받는 방식으로 통신을 수행합니다</a:t>
+            </a:r>
+            <a:endParaRPr lang="en-US" altLang="ko-KR" sz="1600" dirty="0"/>
+          </a:p>
+          <a:p>
+            <a:pPr marL="342900" indent="-342900">
+              <a:buFont typeface="+mj-lt"/>
+              <a:buAutoNum type="arabicPeriod"/>
+            </a:pPr>
+            <a:r>
+              <a:rPr lang="ko-KR" altLang="en-US" sz="1400" dirty="0"/>
+              <a:t>수동 스캐닝</a:t>
+            </a:r>
+            <a:r>
+              <a:rPr lang="en-US" altLang="ko-KR" sz="1400" dirty="0"/>
+              <a:t>: </a:t>
+            </a:r>
+            <a:r>
+              <a:rPr lang="ko-KR" altLang="en-US" sz="1400" dirty="0"/>
+              <a:t>신호기가 임의로 뿌린 비컨 프레임을 단말기가 받으면</a:t>
+            </a:r>
+            <a:r>
+              <a:rPr lang="en-US" altLang="ko-KR" sz="1400" dirty="0"/>
+              <a:t>, </a:t>
+            </a:r>
+            <a:r>
+              <a:rPr lang="ko-KR" altLang="en-US" sz="1400" dirty="0"/>
+              <a:t>단말기는 뿌린 신호기에게</a:t>
+            </a:r>
+            <a:br>
+              <a:rPr lang="en-US" altLang="ko-KR" sz="1400" dirty="0"/>
+            </a:br>
+            <a:r>
+              <a:rPr lang="ko-KR" altLang="en-US" sz="1400" dirty="0"/>
+              <a:t>응답 프레임을 보내는 구조로 연결을 맺습니다 </a:t>
+            </a:r>
+            <a:endParaRPr lang="en-US" altLang="ko-KR" sz="1400" dirty="0"/>
+          </a:p>
+          <a:p>
+            <a:pPr marL="342900" indent="-342900">
+              <a:buFont typeface="+mj-lt"/>
+              <a:buAutoNum type="arabicPeriod"/>
+            </a:pPr>
+            <a:r>
+              <a:rPr lang="ko-KR" altLang="en-US" sz="1400" dirty="0"/>
+              <a:t>능동 스캐닝</a:t>
+            </a:r>
+            <a:r>
+              <a:rPr lang="en-US" altLang="ko-KR" sz="1400" dirty="0"/>
+              <a:t>: </a:t>
+            </a:r>
+            <a:r>
+              <a:rPr lang="ko-KR" altLang="en-US" sz="1400" dirty="0"/>
+              <a:t>단말기가 신호기에게 정기적으로 </a:t>
+            </a:r>
+            <a:r>
+              <a:rPr lang="ko-KR" altLang="en-US" sz="1400" dirty="0" err="1"/>
+              <a:t>프로브</a:t>
+            </a:r>
+            <a:r>
+              <a:rPr lang="en-US" altLang="ko-KR" sz="1400" dirty="0"/>
+              <a:t>(probe)</a:t>
+            </a:r>
+            <a:r>
+              <a:rPr lang="ko-KR" altLang="en-US" sz="1400" dirty="0"/>
+              <a:t>프레임을 보내면</a:t>
+            </a:r>
+            <a:r>
+              <a:rPr lang="en-US" altLang="ko-KR" sz="1400" dirty="0"/>
+              <a:t>,</a:t>
+            </a:r>
+            <a:br>
+              <a:rPr lang="en-US" altLang="ko-KR" sz="1400" dirty="0"/>
+            </a:br>
+            <a:r>
+              <a:rPr lang="ko-KR" altLang="en-US" sz="1400" dirty="0"/>
+              <a:t>신호기는 해당 요청에 응답 프레임을 보내는 구조로 연결을 맺습니다</a:t>
+            </a:r>
+            <a:endParaRPr lang="en-US" altLang="ko-KR" sz="1400" dirty="0"/>
+          </a:p>
+          <a:p>
+            <a:r>
+              <a:rPr lang="ko-KR" altLang="en-US" sz="1600" dirty="0"/>
+              <a:t>무선랜은 매체접근을 </a:t>
+            </a:r>
+            <a:r>
+              <a:rPr lang="en-US" altLang="ko-KR" sz="1600" dirty="0"/>
+              <a:t>MAC</a:t>
+            </a:r>
+            <a:r>
+              <a:rPr lang="ko-KR" altLang="en-US" sz="1600" dirty="0"/>
+              <a:t>을 통해서 수행합니다 다음은 매체접근제어방식 두 가지를 나열 한 것입니다</a:t>
+            </a:r>
+            <a:endParaRPr lang="en-US" altLang="ko-KR" sz="1600" dirty="0"/>
+          </a:p>
+          <a:p>
+            <a:pPr marL="342900" indent="-342900">
+              <a:buFont typeface="+mj-lt"/>
+              <a:buAutoNum type="arabicPeriod"/>
+            </a:pPr>
+            <a:r>
+              <a:rPr lang="en-US" altLang="ko-KR" sz="1400" dirty="0"/>
+              <a:t>DCF(Distributed Coordination Function): </a:t>
+            </a:r>
+            <a:r>
+              <a:rPr lang="ko-KR" altLang="en-US" sz="1400" dirty="0"/>
+              <a:t>단말기들이 데이터 충돌을 회피</a:t>
+            </a:r>
+            <a:r>
+              <a:rPr lang="en-US" altLang="ko-KR" sz="1400" dirty="0"/>
+              <a:t>(CSMA/CA)</a:t>
+            </a:r>
+            <a:r>
+              <a:rPr lang="ko-KR" altLang="en-US" sz="1400" dirty="0"/>
+              <a:t>하기 위해 미리 감지 후 대기</a:t>
+            </a:r>
+            <a:endParaRPr lang="en-US" altLang="ko-KR" sz="1400" dirty="0"/>
+          </a:p>
+          <a:p>
+            <a:pPr marL="342900" indent="-342900">
+              <a:buFont typeface="+mj-lt"/>
+              <a:buAutoNum type="arabicPeriod"/>
+            </a:pPr>
+            <a:r>
+              <a:rPr lang="en-US" altLang="ko-KR" sz="1400" dirty="0"/>
+              <a:t>PCF(Point Coordination Function): </a:t>
+            </a:r>
+            <a:r>
+              <a:rPr lang="ko-KR" altLang="en-US" sz="1400" dirty="0"/>
+              <a:t>신호기가 단말기들에게 직접 중재하는 방식으로 대기</a:t>
+            </a:r>
+          </a:p>
+        </p:txBody>
+      </p:sp>
+    </p:spTree>
+    <p:extLst>
+      <p:ext uri="{BB962C8B-B14F-4D97-AF65-F5344CB8AC3E}">
+        <p14:creationId xmlns:p14="http://schemas.microsoft.com/office/powerpoint/2010/main" val="1303002981"/>
+      </p:ext>
+    </p:extLst>
+  </p:cSld>
+  <p:clrMapOvr>
+    <a:masterClrMapping/>
+  </p:clrMapOvr>
+</p:sld>
+</file>
+
+<file path=ppt/slides/slide32.xml><?xml version="1.0" encoding="utf-8"?>
+<p:sld xmlns:a="http://schemas.openxmlformats.org/drawingml/2006/main" xmlns:r="http://schemas.openxmlformats.org/officeDocument/2006/relationships" xmlns:p="http://schemas.openxmlformats.org/presentationml/2006/main">
+  <p:cSld>
+    <p:spTree>
+      <p:nvGrpSpPr>
+        <p:cNvPr id="1" name=""/>
+        <p:cNvGrpSpPr/>
+        <p:nvPr/>
+      </p:nvGrpSpPr>
+      <p:grpSpPr>
+        <a:xfrm>
+          <a:off x="0" y="0"/>
+          <a:ext cx="0" cy="0"/>
+          <a:chOff x="0" y="0"/>
+          <a:chExt cx="0" cy="0"/>
+        </a:xfrm>
+      </p:grpSpPr>
+      <p:sp>
+        <p:nvSpPr>
+          <p:cNvPr id="2" name="제목 1">
+            <a:extLst>
+              <a:ext uri="{FF2B5EF4-FFF2-40B4-BE49-F238E27FC236}">
+                <a16:creationId xmlns:a16="http://schemas.microsoft.com/office/drawing/2014/main" id="{65102E3B-2E4F-EFAD-BE72-F2112DA6669F}"/>
+              </a:ext>
+            </a:extLst>
+          </p:cNvPr>
+          <p:cNvSpPr>
+            <a:spLocks noGrp="1"/>
+          </p:cNvSpPr>
+          <p:nvPr>
+            <p:ph type="title"/>
+          </p:nvPr>
+        </p:nvSpPr>
+        <p:spPr/>
+        <p:txBody>
+          <a:bodyPr/>
+          <a:lstStyle/>
+          <a:p>
+            <a:r>
+              <a:rPr lang="en-US" altLang="ko-KR" dirty="0"/>
+              <a:t>CSMA/CA</a:t>
+            </a:r>
+            <a:endParaRPr lang="ko-KR" altLang="en-US" dirty="0"/>
+          </a:p>
+        </p:txBody>
+      </p:sp>
+      <p:sp>
+        <p:nvSpPr>
+          <p:cNvPr id="3" name="내용 개체 틀 2">
+            <a:extLst>
+              <a:ext uri="{FF2B5EF4-FFF2-40B4-BE49-F238E27FC236}">
+                <a16:creationId xmlns:a16="http://schemas.microsoft.com/office/drawing/2014/main" id="{EF57BD06-CFF3-DFC1-936E-107FDBA5AF0A}"/>
+              </a:ext>
+            </a:extLst>
+          </p:cNvPr>
+          <p:cNvSpPr>
+            <a:spLocks noGrp="1"/>
+          </p:cNvSpPr>
+          <p:nvPr>
+            <p:ph idx="1"/>
+          </p:nvPr>
+        </p:nvSpPr>
+        <p:spPr>
+          <a:xfrm>
+            <a:off x="762000" y="1765139"/>
+            <a:ext cx="10759440" cy="5048616"/>
+          </a:xfrm>
+        </p:spPr>
+        <p:txBody>
+          <a:bodyPr/>
+          <a:lstStyle/>
+          <a:p>
+            <a:r>
+              <a:rPr lang="ko-KR" altLang="en-US" sz="1600" dirty="0"/>
+              <a:t>무선 신호기의 태생적인 구조와 다중 접속 중인 단말기들을 네트워크에서는</a:t>
+            </a:r>
+            <a:br>
+              <a:rPr lang="en-US" altLang="ko-KR" sz="1600" dirty="0"/>
+            </a:br>
+            <a:r>
+              <a:rPr lang="ko-KR" altLang="en-US" sz="1600" dirty="0"/>
+              <a:t>다중 접속 프로토콜</a:t>
+            </a:r>
+            <a:r>
+              <a:rPr lang="en-US" altLang="ko-KR" sz="1600" dirty="0"/>
+              <a:t>(</a:t>
+            </a:r>
+            <a:r>
+              <a:rPr lang="ko-KR" altLang="en-US" sz="1600" dirty="0"/>
+              <a:t>충돌회피</a:t>
+            </a:r>
+            <a:r>
+              <a:rPr lang="en-US" altLang="ko-KR" sz="1600" dirty="0"/>
+              <a:t>)</a:t>
+            </a:r>
+            <a:r>
+              <a:rPr lang="ko-KR" altLang="en-US" sz="1600" dirty="0"/>
+              <a:t>이 필수적으로 존재해야 할 것입니다</a:t>
+            </a:r>
+            <a:endParaRPr lang="en-US" altLang="ko-KR" sz="1600" dirty="0"/>
+          </a:p>
+          <a:p>
+            <a:r>
+              <a:rPr lang="en-US" altLang="ko-KR" sz="1600" dirty="0"/>
+              <a:t>CSMA/CA(Carrier-Sense Multiple Access with Collision Avoidance)</a:t>
+            </a:r>
+            <a:r>
+              <a:rPr lang="ko-KR" altLang="en-US" sz="1600" dirty="0"/>
+              <a:t>는</a:t>
+            </a:r>
+            <a:br>
+              <a:rPr lang="en-US" altLang="ko-KR" sz="1600" dirty="0"/>
+            </a:br>
+            <a:r>
+              <a:rPr lang="ko-KR" altLang="en-US" sz="1600" dirty="0"/>
+              <a:t>데이터의 충돌을 최대한 회피하는 방향으로 설계된 프로토콜로 다음 다섯 가지 단계를 거칩니다</a:t>
+            </a:r>
+            <a:endParaRPr lang="en-US" altLang="ko-KR" sz="1600" dirty="0"/>
+          </a:p>
+          <a:p>
+            <a:pPr marL="342900" indent="-342900">
+              <a:buFont typeface="+mj-lt"/>
+              <a:buAutoNum type="arabicPeriod"/>
+            </a:pPr>
+            <a:r>
+              <a:rPr lang="ko-KR" altLang="en-US" sz="1400" dirty="0"/>
+              <a:t>프레임을 전송하고자 하는 단말기는 신호기가 </a:t>
+            </a:r>
+            <a:r>
+              <a:rPr lang="en-US" altLang="ko-KR" sz="1400" dirty="0"/>
+              <a:t>idle</a:t>
+            </a:r>
+            <a:r>
+              <a:rPr lang="ko-KR" altLang="en-US" sz="1400" dirty="0"/>
+              <a:t>인 상태가 될 때까지 기다립니다</a:t>
+            </a:r>
+            <a:endParaRPr lang="en-US" altLang="ko-KR" sz="1400" dirty="0"/>
+          </a:p>
+          <a:p>
+            <a:pPr marL="342900" indent="-342900">
+              <a:buFont typeface="+mj-lt"/>
+              <a:buAutoNum type="arabicPeriod"/>
+            </a:pPr>
+            <a:r>
+              <a:rPr lang="ko-KR" altLang="en-US" sz="1400" dirty="0"/>
+              <a:t>만약 </a:t>
+            </a:r>
+            <a:r>
+              <a:rPr lang="en-US" altLang="ko-KR" sz="1400" dirty="0"/>
+              <a:t>idle </a:t>
+            </a:r>
+            <a:r>
+              <a:rPr lang="ko-KR" altLang="en-US" sz="1400" dirty="0"/>
+              <a:t>상태가 된다면</a:t>
+            </a:r>
+            <a:r>
+              <a:rPr lang="en-US" altLang="ko-KR" sz="1400" dirty="0"/>
+              <a:t>, </a:t>
+            </a:r>
+            <a:r>
+              <a:rPr lang="ko-KR" altLang="en-US" sz="1400" dirty="0"/>
+              <a:t>다른 단말기가 사용할 가능성도 있기 때문에</a:t>
+            </a:r>
+            <a:r>
+              <a:rPr lang="en-US" altLang="ko-KR" sz="1400" dirty="0"/>
+              <a:t>,</a:t>
+            </a:r>
+            <a:br>
+              <a:rPr lang="en-US" altLang="ko-KR" sz="1400" dirty="0"/>
+            </a:br>
+            <a:r>
+              <a:rPr lang="en-US" altLang="ko-KR" sz="1400" dirty="0"/>
+              <a:t>DIFS(Distributed </a:t>
+            </a:r>
+            <a:r>
+              <a:rPr lang="en-US" altLang="ko-KR" sz="1400" dirty="0" err="1"/>
+              <a:t>InterFrame</a:t>
+            </a:r>
+            <a:r>
+              <a:rPr lang="en-US" altLang="ko-KR" sz="1400" dirty="0"/>
+              <a:t> Space)</a:t>
+            </a:r>
+            <a:r>
+              <a:rPr lang="ko-KR" altLang="en-US" sz="1400" dirty="0"/>
+              <a:t>시간동안 추가로 대기합니다</a:t>
+            </a:r>
+            <a:endParaRPr lang="en-US" altLang="ko-KR" sz="1400" dirty="0"/>
+          </a:p>
+          <a:p>
+            <a:pPr marL="342900" indent="-342900">
+              <a:buFont typeface="+mj-lt"/>
+              <a:buAutoNum type="arabicPeriod"/>
+            </a:pPr>
+            <a:r>
+              <a:rPr lang="en-US" altLang="ko-KR" sz="1400" dirty="0"/>
+              <a:t>DIFS</a:t>
+            </a:r>
+            <a:r>
+              <a:rPr lang="ko-KR" altLang="en-US" sz="1400" dirty="0"/>
+              <a:t>가 지난 뒤에도 </a:t>
+            </a:r>
+            <a:r>
+              <a:rPr lang="en-US" altLang="ko-KR" sz="1400" dirty="0"/>
+              <a:t>idle</a:t>
+            </a:r>
+            <a:r>
+              <a:rPr lang="ko-KR" altLang="en-US" sz="1400" dirty="0"/>
+              <a:t>이라면</a:t>
+            </a:r>
+            <a:r>
+              <a:rPr lang="en-US" altLang="ko-KR" sz="1400" dirty="0"/>
+              <a:t>, </a:t>
+            </a:r>
+            <a:r>
+              <a:rPr lang="ko-KR" altLang="en-US" sz="1400" dirty="0"/>
+              <a:t>수신자로부터 응답을 대기하고 프레임을 전송합니다</a:t>
+            </a:r>
+            <a:endParaRPr lang="en-US" altLang="ko-KR" sz="1400" dirty="0"/>
+          </a:p>
+          <a:p>
+            <a:pPr marL="342900" indent="-342900">
+              <a:buFont typeface="+mj-lt"/>
+              <a:buAutoNum type="arabicPeriod"/>
+            </a:pPr>
+            <a:r>
+              <a:rPr lang="ko-KR" altLang="en-US" sz="1400" dirty="0"/>
+              <a:t>만약</a:t>
+            </a:r>
+            <a:r>
+              <a:rPr lang="en-US" altLang="ko-KR" sz="1400" dirty="0"/>
+              <a:t>, idle</a:t>
+            </a:r>
+            <a:r>
+              <a:rPr lang="ko-KR" altLang="en-US" sz="1400" dirty="0"/>
+              <a:t>이 아니라면</a:t>
+            </a:r>
+            <a:r>
+              <a:rPr lang="en-US" altLang="ko-KR" sz="1400" dirty="0"/>
+              <a:t>, </a:t>
+            </a:r>
+            <a:r>
+              <a:rPr lang="ko-KR" altLang="en-US" sz="1400" dirty="0"/>
+              <a:t>랜덤 </a:t>
+            </a:r>
+            <a:r>
+              <a:rPr lang="ko-KR" altLang="en-US" sz="1400" dirty="0" err="1"/>
+              <a:t>백오프</a:t>
+            </a:r>
+            <a:r>
+              <a:rPr lang="en-US" altLang="ko-KR" sz="1400" dirty="0"/>
+              <a:t>(Random Backoff)</a:t>
+            </a:r>
+            <a:r>
+              <a:rPr lang="ko-KR" altLang="en-US" sz="1400" dirty="0"/>
+              <a:t>시간을 추가하여 대기하고</a:t>
+            </a:r>
+            <a:r>
+              <a:rPr lang="en-US" altLang="ko-KR" sz="1400" dirty="0"/>
+              <a:t>,</a:t>
+            </a:r>
+            <a:br>
+              <a:rPr lang="en-US" altLang="ko-KR" sz="1400" dirty="0"/>
+            </a:br>
+            <a:r>
+              <a:rPr lang="ko-KR" altLang="en-US" sz="1400" dirty="0" err="1"/>
+              <a:t>백오프</a:t>
+            </a:r>
+            <a:r>
+              <a:rPr lang="ko-KR" altLang="en-US" sz="1400" dirty="0"/>
+              <a:t> 시간 카운터는 정해진 슬롯 시간</a:t>
+            </a:r>
+            <a:r>
+              <a:rPr lang="en-US" altLang="ko-KR" sz="1400" dirty="0"/>
+              <a:t>(slot time)</a:t>
+            </a:r>
+            <a:r>
+              <a:rPr lang="ko-KR" altLang="en-US" sz="1400" dirty="0"/>
+              <a:t>마다 감소하는 방식으로</a:t>
+            </a:r>
+            <a:br>
+              <a:rPr lang="en-US" altLang="ko-KR" sz="1400" dirty="0"/>
+            </a:br>
+            <a:r>
+              <a:rPr lang="ko-KR" altLang="en-US" sz="1400" dirty="0"/>
+              <a:t>카운터가 다 되면</a:t>
+            </a:r>
+            <a:r>
+              <a:rPr lang="en-US" altLang="ko-KR" sz="1400" dirty="0"/>
+              <a:t>(0</a:t>
+            </a:r>
+            <a:r>
+              <a:rPr lang="ko-KR" altLang="en-US" sz="1400" dirty="0"/>
+              <a:t>에 다다르면</a:t>
+            </a:r>
+            <a:r>
+              <a:rPr lang="en-US" altLang="ko-KR" sz="1400" dirty="0"/>
+              <a:t>), </a:t>
+            </a:r>
+            <a:r>
+              <a:rPr lang="ko-KR" altLang="en-US" sz="1400" dirty="0"/>
+              <a:t>프레임을 전송하고 응답을 대기합니다</a:t>
+            </a:r>
+            <a:endParaRPr lang="en-US" altLang="ko-KR" sz="1400" dirty="0"/>
+          </a:p>
+          <a:p>
+            <a:pPr marL="342900" indent="-342900">
+              <a:buFont typeface="+mj-lt"/>
+              <a:buAutoNum type="arabicPeriod"/>
+            </a:pPr>
+            <a:r>
+              <a:rPr lang="ko-KR" altLang="en-US" sz="1400" dirty="0"/>
+              <a:t>응답이 오지 않을 경우 더 큰 </a:t>
+            </a:r>
+            <a:r>
+              <a:rPr lang="ko-KR" altLang="en-US" sz="1400" dirty="0" err="1"/>
+              <a:t>백오프</a:t>
+            </a:r>
+            <a:r>
+              <a:rPr lang="ko-KR" altLang="en-US" sz="1400" dirty="0"/>
+              <a:t> 시간을 세팅하고 다시 </a:t>
+            </a:r>
+            <a:r>
+              <a:rPr lang="ko-KR" altLang="en-US" sz="1400" dirty="0" err="1"/>
+              <a:t>백오프</a:t>
+            </a:r>
+            <a:r>
+              <a:rPr lang="ko-KR" altLang="en-US" sz="1400" dirty="0"/>
+              <a:t> 절차를 수행하는 방식으로 동작합니다</a:t>
+            </a:r>
+            <a:endParaRPr lang="en-US" altLang="ko-KR" sz="1400" dirty="0"/>
+          </a:p>
+          <a:p>
+            <a:r>
+              <a:rPr lang="ko-KR" altLang="en-US" sz="1600" dirty="0"/>
+              <a:t>그러나 랜덤 </a:t>
+            </a:r>
+            <a:r>
+              <a:rPr lang="ko-KR" altLang="en-US" sz="1600" dirty="0" err="1"/>
+              <a:t>백오프</a:t>
+            </a:r>
+            <a:r>
+              <a:rPr lang="ko-KR" altLang="en-US" sz="1600" dirty="0"/>
+              <a:t> 시간 지연 전략을 사용하더라도 숨겨진 단말 문제는 해결 할 수 없어</a:t>
+            </a:r>
+            <a:br>
+              <a:rPr lang="en-US" altLang="ko-KR" sz="1600" dirty="0"/>
+            </a:br>
+            <a:r>
+              <a:rPr lang="en-US" altLang="ko-KR" sz="1600" dirty="0"/>
+              <a:t>RTS/CTS </a:t>
+            </a:r>
+            <a:r>
+              <a:rPr lang="ko-KR" altLang="en-US" sz="1600" dirty="0"/>
+              <a:t>프레임 교환방식을 추가로 사용하여 이를 해결합니다</a:t>
+            </a:r>
+            <a:br>
+              <a:rPr lang="en-US" altLang="ko-KR" sz="1600" dirty="0"/>
+            </a:br>
+            <a:r>
+              <a:rPr lang="en-US" altLang="ko-KR" sz="1600" dirty="0"/>
+              <a:t>(</a:t>
+            </a:r>
+            <a:r>
+              <a:rPr lang="ko-KR" altLang="en-US" sz="1600" dirty="0"/>
+              <a:t>숨겨진 단말</a:t>
+            </a:r>
+            <a:r>
+              <a:rPr lang="en-US" altLang="ko-KR" sz="1600" dirty="0"/>
+              <a:t>(hidden terminal): </a:t>
+            </a:r>
+            <a:r>
+              <a:rPr lang="ko-KR" altLang="en-US" sz="1600" dirty="0"/>
+              <a:t>두 단말기가 서로 물리적 통신 범위를 벗어나 서로에 대해 모르는 경우</a:t>
+            </a:r>
+            <a:r>
+              <a:rPr lang="en-US" altLang="ko-KR" sz="1600" dirty="0"/>
+              <a:t>)</a:t>
+            </a:r>
+            <a:br>
+              <a:rPr lang="en-US" altLang="ko-KR" sz="1400" dirty="0"/>
+            </a:br>
+            <a:endParaRPr lang="ko-KR" altLang="en-US" sz="1400" dirty="0"/>
+          </a:p>
+        </p:txBody>
+      </p:sp>
+    </p:spTree>
+    <p:extLst>
+      <p:ext uri="{BB962C8B-B14F-4D97-AF65-F5344CB8AC3E}">
+        <p14:creationId xmlns:p14="http://schemas.microsoft.com/office/powerpoint/2010/main" val="4216409230"/>
       </p:ext>
     </p:extLst>
   </p:cSld>

</xml_diff>